<commit_message>
Use cases diagrams done
</commit_message>
<xml_diff>
--- a/Deneuville_Fabian_1_diagramme_cas_usage_032023.pptx
+++ b/Deneuville_Fabian_1_diagramme_cas_usage_032023.pptx
@@ -3403,8 +3403,8 @@
         </p:blipFill>
         <p:spPr>
           <a:xfrm>
-            <a:off x="4096422" y="1198605"/>
-            <a:ext cx="3999154" cy="2030340"/>
+            <a:off x="4624379" y="1525775"/>
+            <a:ext cx="2943241" cy="1494261"/>
           </a:xfrm>
           <a:prstGeom prst="rect">
             <a:avLst/>
@@ -8474,7 +8474,1272 @@
                   <a:schemeClr val="bg1"/>
                 </a:solidFill>
               </a:rPr>
-              <a:t>Chat</a:t>
+              <a:t>Messagerie</a:t>
+            </a:r>
+          </a:p>
+        </p:txBody>
+      </p:sp>
+      <p:sp>
+        <p:nvSpPr>
+          <p:cNvPr id="8" name="Rectangle 7">
+            <a:extLst>
+              <a:ext uri="{FF2B5EF4-FFF2-40B4-BE49-F238E27FC236}">
+                <a16:creationId xmlns:a16="http://schemas.microsoft.com/office/drawing/2014/main" id="{8BA28EF0-DBB2-7716-32A9-0DD866B9703B}"/>
+              </a:ext>
+            </a:extLst>
+          </p:cNvPr>
+          <p:cNvSpPr/>
+          <p:nvPr/>
+        </p:nvSpPr>
+        <p:spPr>
+          <a:xfrm>
+            <a:off x="4762148" y="1247861"/>
+            <a:ext cx="2667699" cy="553673"/>
+          </a:xfrm>
+          <a:prstGeom prst="rect">
+            <a:avLst/>
+          </a:prstGeom>
+          <a:solidFill>
+            <a:srgbClr val="D83950"/>
+          </a:solidFill>
+          <a:ln>
+            <a:solidFill>
+              <a:srgbClr val="D83950"/>
+            </a:solidFill>
+          </a:ln>
+        </p:spPr>
+        <p:style>
+          <a:lnRef idx="2">
+            <a:schemeClr val="accent1">
+              <a:shade val="50000"/>
+            </a:schemeClr>
+          </a:lnRef>
+          <a:fillRef idx="1">
+            <a:schemeClr val="accent1"/>
+          </a:fillRef>
+          <a:effectRef idx="0">
+            <a:schemeClr val="accent1"/>
+          </a:effectRef>
+          <a:fontRef idx="minor">
+            <a:schemeClr val="lt1"/>
+          </a:fontRef>
+        </p:style>
+        <p:txBody>
+          <a:bodyPr rtlCol="0" anchor="ctr"/>
+          <a:lstStyle/>
+          <a:p>
+            <a:pPr algn="ctr"/>
+            <a:r>
+              <a:rPr lang="fr-FR" sz="1400" dirty="0"/>
+              <a:t>Liste des pédagogue</a:t>
+            </a:r>
+          </a:p>
+        </p:txBody>
+      </p:sp>
+      <p:sp>
+        <p:nvSpPr>
+          <p:cNvPr id="9" name="Rectangle 8">
+            <a:extLst>
+              <a:ext uri="{FF2B5EF4-FFF2-40B4-BE49-F238E27FC236}">
+                <a16:creationId xmlns:a16="http://schemas.microsoft.com/office/drawing/2014/main" id="{21CFD2E9-C827-4661-CCD8-DC704F306628}"/>
+              </a:ext>
+            </a:extLst>
+          </p:cNvPr>
+          <p:cNvSpPr/>
+          <p:nvPr/>
+        </p:nvSpPr>
+        <p:spPr>
+          <a:xfrm>
+            <a:off x="4762149" y="3152163"/>
+            <a:ext cx="2667699" cy="553673"/>
+          </a:xfrm>
+          <a:prstGeom prst="rect">
+            <a:avLst/>
+          </a:prstGeom>
+          <a:solidFill>
+            <a:srgbClr val="D83950"/>
+          </a:solidFill>
+          <a:ln>
+            <a:solidFill>
+              <a:srgbClr val="D83950"/>
+            </a:solidFill>
+          </a:ln>
+        </p:spPr>
+        <p:style>
+          <a:lnRef idx="2">
+            <a:schemeClr val="accent1">
+              <a:shade val="50000"/>
+            </a:schemeClr>
+          </a:lnRef>
+          <a:fillRef idx="1">
+            <a:schemeClr val="accent1"/>
+          </a:fillRef>
+          <a:effectRef idx="0">
+            <a:schemeClr val="accent1"/>
+          </a:effectRef>
+          <a:fontRef idx="minor">
+            <a:schemeClr val="lt1"/>
+          </a:fontRef>
+        </p:style>
+        <p:txBody>
+          <a:bodyPr rtlCol="0" anchor="ctr"/>
+          <a:lstStyle/>
+          <a:p>
+            <a:pPr algn="ctr"/>
+            <a:r>
+              <a:rPr lang="fr-FR" sz="1400" dirty="0"/>
+              <a:t>Conversation</a:t>
+            </a:r>
+          </a:p>
+        </p:txBody>
+      </p:sp>
+      <p:sp>
+        <p:nvSpPr>
+          <p:cNvPr id="10" name="Rectangle 9">
+            <a:extLst>
+              <a:ext uri="{FF2B5EF4-FFF2-40B4-BE49-F238E27FC236}">
+                <a16:creationId xmlns:a16="http://schemas.microsoft.com/office/drawing/2014/main" id="{3D73EB60-5DB7-2471-76C2-D857EA6E5293}"/>
+              </a:ext>
+            </a:extLst>
+          </p:cNvPr>
+          <p:cNvSpPr/>
+          <p:nvPr/>
+        </p:nvSpPr>
+        <p:spPr>
+          <a:xfrm>
+            <a:off x="4762148" y="5056466"/>
+            <a:ext cx="2667699" cy="553673"/>
+          </a:xfrm>
+          <a:prstGeom prst="rect">
+            <a:avLst/>
+          </a:prstGeom>
+          <a:solidFill>
+            <a:srgbClr val="D83950"/>
+          </a:solidFill>
+          <a:ln>
+            <a:solidFill>
+              <a:srgbClr val="D83950"/>
+            </a:solidFill>
+          </a:ln>
+        </p:spPr>
+        <p:style>
+          <a:lnRef idx="2">
+            <a:schemeClr val="accent1">
+              <a:shade val="50000"/>
+            </a:schemeClr>
+          </a:lnRef>
+          <a:fillRef idx="1">
+            <a:schemeClr val="accent1"/>
+          </a:fillRef>
+          <a:effectRef idx="0">
+            <a:schemeClr val="accent1"/>
+          </a:effectRef>
+          <a:fontRef idx="minor">
+            <a:schemeClr val="lt1"/>
+          </a:fontRef>
+        </p:style>
+        <p:txBody>
+          <a:bodyPr rtlCol="0" anchor="ctr"/>
+          <a:lstStyle/>
+          <a:p>
+            <a:pPr algn="ctr"/>
+            <a:r>
+              <a:rPr lang="fr-FR" sz="1400" dirty="0"/>
+              <a:t>Message</a:t>
+            </a:r>
+          </a:p>
+        </p:txBody>
+      </p:sp>
+      <p:pic>
+        <p:nvPicPr>
+          <p:cNvPr id="11" name="Image 10">
+            <a:extLst>
+              <a:ext uri="{FF2B5EF4-FFF2-40B4-BE49-F238E27FC236}">
+                <a16:creationId xmlns:a16="http://schemas.microsoft.com/office/drawing/2014/main" id="{4EF247E8-E255-2B78-23DD-E258E7AEA82E}"/>
+              </a:ext>
+            </a:extLst>
+          </p:cNvPr>
+          <p:cNvPicPr>
+            <a:picLocks noChangeAspect="1"/>
+          </p:cNvPicPr>
+          <p:nvPr/>
+        </p:nvPicPr>
+        <p:blipFill>
+          <a:blip r:embed="rId2"/>
+          <a:stretch>
+            <a:fillRect/>
+          </a:stretch>
+        </p:blipFill>
+        <p:spPr>
+          <a:xfrm>
+            <a:off x="361952" y="2486891"/>
+            <a:ext cx="847898" cy="1884218"/>
+          </a:xfrm>
+          <a:prstGeom prst="rect">
+            <a:avLst/>
+          </a:prstGeom>
+        </p:spPr>
+      </p:pic>
+      <p:sp>
+        <p:nvSpPr>
+          <p:cNvPr id="12" name="ZoneTexte 11">
+            <a:extLst>
+              <a:ext uri="{FF2B5EF4-FFF2-40B4-BE49-F238E27FC236}">
+                <a16:creationId xmlns:a16="http://schemas.microsoft.com/office/drawing/2014/main" id="{6A6AED51-FF76-DC86-B0E0-61715FB77532}"/>
+              </a:ext>
+            </a:extLst>
+          </p:cNvPr>
+          <p:cNvSpPr txBox="1"/>
+          <p:nvPr/>
+        </p:nvSpPr>
+        <p:spPr>
+          <a:xfrm>
+            <a:off x="283212" y="2012088"/>
+            <a:ext cx="1005378" cy="369332"/>
+          </a:xfrm>
+          <a:prstGeom prst="rect">
+            <a:avLst/>
+          </a:prstGeom>
+          <a:noFill/>
+        </p:spPr>
+        <p:txBody>
+          <a:bodyPr wrap="square" rtlCol="0">
+            <a:spAutoFit/>
+          </a:bodyPr>
+          <a:lstStyle/>
+          <a:p>
+            <a:pPr algn="ctr"/>
+            <a:r>
+              <a:rPr lang="fr-FR" dirty="0">
+                <a:solidFill>
+                  <a:srgbClr val="D83950"/>
+                </a:solidFill>
+              </a:rPr>
+              <a:t>Élève</a:t>
+            </a:r>
+          </a:p>
+        </p:txBody>
+      </p:sp>
+      <p:pic>
+        <p:nvPicPr>
+          <p:cNvPr id="13" name="Image 12">
+            <a:extLst>
+              <a:ext uri="{FF2B5EF4-FFF2-40B4-BE49-F238E27FC236}">
+                <a16:creationId xmlns:a16="http://schemas.microsoft.com/office/drawing/2014/main" id="{A80623E0-0174-698A-3D88-A2B47C3BE09F}"/>
+              </a:ext>
+            </a:extLst>
+          </p:cNvPr>
+          <p:cNvPicPr>
+            <a:picLocks noChangeAspect="1"/>
+          </p:cNvPicPr>
+          <p:nvPr/>
+        </p:nvPicPr>
+        <p:blipFill>
+          <a:blip r:embed="rId2"/>
+          <a:stretch>
+            <a:fillRect/>
+          </a:stretch>
+        </p:blipFill>
+        <p:spPr>
+          <a:xfrm>
+            <a:off x="10982150" y="2486891"/>
+            <a:ext cx="847898" cy="1884218"/>
+          </a:xfrm>
+          <a:prstGeom prst="rect">
+            <a:avLst/>
+          </a:prstGeom>
+        </p:spPr>
+      </p:pic>
+      <p:sp>
+        <p:nvSpPr>
+          <p:cNvPr id="14" name="ZoneTexte 13">
+            <a:extLst>
+              <a:ext uri="{FF2B5EF4-FFF2-40B4-BE49-F238E27FC236}">
+                <a16:creationId xmlns:a16="http://schemas.microsoft.com/office/drawing/2014/main" id="{C4A2EDD0-ED81-F9E3-E4AA-C3D8E6CCB5BE}"/>
+              </a:ext>
+            </a:extLst>
+          </p:cNvPr>
+          <p:cNvSpPr txBox="1"/>
+          <p:nvPr/>
+        </p:nvSpPr>
+        <p:spPr>
+          <a:xfrm>
+            <a:off x="10664320" y="2012088"/>
+            <a:ext cx="1483558" cy="369332"/>
+          </a:xfrm>
+          <a:prstGeom prst="rect">
+            <a:avLst/>
+          </a:prstGeom>
+          <a:noFill/>
+        </p:spPr>
+        <p:txBody>
+          <a:bodyPr wrap="square" rtlCol="0">
+            <a:spAutoFit/>
+          </a:bodyPr>
+          <a:lstStyle/>
+          <a:p>
+            <a:pPr algn="ctr"/>
+            <a:r>
+              <a:rPr lang="fr-FR" dirty="0">
+                <a:solidFill>
+                  <a:srgbClr val="D83950"/>
+                </a:solidFill>
+              </a:rPr>
+              <a:t>Pédagogue</a:t>
+            </a:r>
+          </a:p>
+        </p:txBody>
+      </p:sp>
+      <p:cxnSp>
+        <p:nvCxnSpPr>
+          <p:cNvPr id="16" name="Connecteur droit avec flèche 15">
+            <a:extLst>
+              <a:ext uri="{FF2B5EF4-FFF2-40B4-BE49-F238E27FC236}">
+                <a16:creationId xmlns:a16="http://schemas.microsoft.com/office/drawing/2014/main" id="{5FB89628-662A-413F-D99C-A6162F8D316F}"/>
+              </a:ext>
+            </a:extLst>
+          </p:cNvPr>
+          <p:cNvCxnSpPr>
+            <a:cxnSpLocks/>
+            <a:stCxn id="11" idx="3"/>
+          </p:cNvCxnSpPr>
+          <p:nvPr/>
+        </p:nvCxnSpPr>
+        <p:spPr>
+          <a:xfrm flipV="1">
+            <a:off x="1209850" y="1501629"/>
+            <a:ext cx="3454429" cy="1927371"/>
+          </a:xfrm>
+          <a:prstGeom prst="straightConnector1">
+            <a:avLst/>
+          </a:prstGeom>
+          <a:ln>
+            <a:solidFill>
+              <a:schemeClr val="tx1"/>
+            </a:solidFill>
+            <a:tailEnd type="triangle"/>
+          </a:ln>
+        </p:spPr>
+        <p:style>
+          <a:lnRef idx="1">
+            <a:schemeClr val="accent1"/>
+          </a:lnRef>
+          <a:fillRef idx="0">
+            <a:schemeClr val="accent1"/>
+          </a:fillRef>
+          <a:effectRef idx="0">
+            <a:schemeClr val="accent1"/>
+          </a:effectRef>
+          <a:fontRef idx="minor">
+            <a:schemeClr val="tx1"/>
+          </a:fontRef>
+        </p:style>
+      </p:cxnSp>
+      <p:cxnSp>
+        <p:nvCxnSpPr>
+          <p:cNvPr id="20" name="Connecteur droit avec flèche 19">
+            <a:extLst>
+              <a:ext uri="{FF2B5EF4-FFF2-40B4-BE49-F238E27FC236}">
+                <a16:creationId xmlns:a16="http://schemas.microsoft.com/office/drawing/2014/main" id="{26459273-3848-4448-3C4E-649DC9FC15AD}"/>
+              </a:ext>
+            </a:extLst>
+          </p:cNvPr>
+          <p:cNvCxnSpPr>
+            <a:cxnSpLocks/>
+          </p:cNvCxnSpPr>
+          <p:nvPr/>
+        </p:nvCxnSpPr>
+        <p:spPr>
+          <a:xfrm>
+            <a:off x="7527718" y="3283495"/>
+            <a:ext cx="2936150" cy="0"/>
+          </a:xfrm>
+          <a:prstGeom prst="straightConnector1">
+            <a:avLst/>
+          </a:prstGeom>
+          <a:ln>
+            <a:solidFill>
+              <a:schemeClr val="tx1"/>
+            </a:solidFill>
+            <a:tailEnd type="triangle"/>
+          </a:ln>
+        </p:spPr>
+        <p:style>
+          <a:lnRef idx="1">
+            <a:schemeClr val="accent1"/>
+          </a:lnRef>
+          <a:fillRef idx="0">
+            <a:schemeClr val="accent1"/>
+          </a:fillRef>
+          <a:effectRef idx="0">
+            <a:schemeClr val="accent1"/>
+          </a:effectRef>
+          <a:fontRef idx="minor">
+            <a:schemeClr val="tx1"/>
+          </a:fontRef>
+        </p:style>
+      </p:cxnSp>
+      <p:cxnSp>
+        <p:nvCxnSpPr>
+          <p:cNvPr id="30" name="Connecteur droit avec flèche 29">
+            <a:extLst>
+              <a:ext uri="{FF2B5EF4-FFF2-40B4-BE49-F238E27FC236}">
+                <a16:creationId xmlns:a16="http://schemas.microsoft.com/office/drawing/2014/main" id="{41733273-9826-B7EC-98D5-6F8E261D5AAD}"/>
+              </a:ext>
+            </a:extLst>
+          </p:cNvPr>
+          <p:cNvCxnSpPr>
+            <a:cxnSpLocks/>
+          </p:cNvCxnSpPr>
+          <p:nvPr/>
+        </p:nvCxnSpPr>
+        <p:spPr>
+          <a:xfrm flipH="1">
+            <a:off x="1728132" y="3283495"/>
+            <a:ext cx="2936147" cy="0"/>
+          </a:xfrm>
+          <a:prstGeom prst="straightConnector1">
+            <a:avLst/>
+          </a:prstGeom>
+          <a:ln>
+            <a:solidFill>
+              <a:schemeClr val="tx1"/>
+            </a:solidFill>
+            <a:tailEnd type="triangle"/>
+          </a:ln>
+        </p:spPr>
+        <p:style>
+          <a:lnRef idx="1">
+            <a:schemeClr val="accent1"/>
+          </a:lnRef>
+          <a:fillRef idx="0">
+            <a:schemeClr val="accent1"/>
+          </a:fillRef>
+          <a:effectRef idx="0">
+            <a:schemeClr val="accent1"/>
+          </a:effectRef>
+          <a:fontRef idx="minor">
+            <a:schemeClr val="tx1"/>
+          </a:fontRef>
+        </p:style>
+      </p:cxnSp>
+      <p:cxnSp>
+        <p:nvCxnSpPr>
+          <p:cNvPr id="35" name="Connecteur droit avec flèche 34">
+            <a:extLst>
+              <a:ext uri="{FF2B5EF4-FFF2-40B4-BE49-F238E27FC236}">
+                <a16:creationId xmlns:a16="http://schemas.microsoft.com/office/drawing/2014/main" id="{0F2888DF-BB43-7C06-DE93-CE9EF612586B}"/>
+              </a:ext>
+            </a:extLst>
+          </p:cNvPr>
+          <p:cNvCxnSpPr>
+            <a:stCxn id="8" idx="2"/>
+          </p:cNvCxnSpPr>
+          <p:nvPr/>
+        </p:nvCxnSpPr>
+        <p:spPr>
+          <a:xfrm flipH="1">
+            <a:off x="6095997" y="1801534"/>
+            <a:ext cx="1" cy="1350629"/>
+          </a:xfrm>
+          <a:prstGeom prst="straightConnector1">
+            <a:avLst/>
+          </a:prstGeom>
+          <a:ln>
+            <a:solidFill>
+              <a:schemeClr val="tx1"/>
+            </a:solidFill>
+            <a:tailEnd type="triangle"/>
+          </a:ln>
+        </p:spPr>
+        <p:style>
+          <a:lnRef idx="1">
+            <a:schemeClr val="accent1"/>
+          </a:lnRef>
+          <a:fillRef idx="0">
+            <a:schemeClr val="accent1"/>
+          </a:fillRef>
+          <a:effectRef idx="0">
+            <a:schemeClr val="accent1"/>
+          </a:effectRef>
+          <a:fontRef idx="minor">
+            <a:schemeClr val="tx1"/>
+          </a:fontRef>
+        </p:style>
+      </p:cxnSp>
+      <p:cxnSp>
+        <p:nvCxnSpPr>
+          <p:cNvPr id="37" name="Connecteur droit avec flèche 36">
+            <a:extLst>
+              <a:ext uri="{FF2B5EF4-FFF2-40B4-BE49-F238E27FC236}">
+                <a16:creationId xmlns:a16="http://schemas.microsoft.com/office/drawing/2014/main" id="{B9DF4121-4C9B-9902-9E42-53CDBFD938BD}"/>
+              </a:ext>
+            </a:extLst>
+          </p:cNvPr>
+          <p:cNvCxnSpPr>
+            <a:stCxn id="10" idx="0"/>
+            <a:endCxn id="9" idx="2"/>
+          </p:cNvCxnSpPr>
+          <p:nvPr/>
+        </p:nvCxnSpPr>
+        <p:spPr>
+          <a:xfrm flipV="1">
+            <a:off x="6095998" y="3705836"/>
+            <a:ext cx="1" cy="1350630"/>
+          </a:xfrm>
+          <a:prstGeom prst="straightConnector1">
+            <a:avLst/>
+          </a:prstGeom>
+          <a:ln>
+            <a:solidFill>
+              <a:schemeClr val="tx1"/>
+            </a:solidFill>
+            <a:tailEnd type="triangle"/>
+          </a:ln>
+        </p:spPr>
+        <p:style>
+          <a:lnRef idx="1">
+            <a:schemeClr val="accent1"/>
+          </a:lnRef>
+          <a:fillRef idx="0">
+            <a:schemeClr val="accent1"/>
+          </a:fillRef>
+          <a:effectRef idx="0">
+            <a:schemeClr val="accent1"/>
+          </a:effectRef>
+          <a:fontRef idx="minor">
+            <a:schemeClr val="tx1"/>
+          </a:fontRef>
+        </p:style>
+      </p:cxnSp>
+      <p:cxnSp>
+        <p:nvCxnSpPr>
+          <p:cNvPr id="43" name="Connecteur droit avec flèche 42">
+            <a:extLst>
+              <a:ext uri="{FF2B5EF4-FFF2-40B4-BE49-F238E27FC236}">
+                <a16:creationId xmlns:a16="http://schemas.microsoft.com/office/drawing/2014/main" id="{0C261178-58C7-AB82-6C5C-A45C655CEE6F}"/>
+              </a:ext>
+            </a:extLst>
+          </p:cNvPr>
+          <p:cNvCxnSpPr>
+            <a:cxnSpLocks/>
+          </p:cNvCxnSpPr>
+          <p:nvPr/>
+        </p:nvCxnSpPr>
+        <p:spPr>
+          <a:xfrm>
+            <a:off x="1209846" y="3428999"/>
+            <a:ext cx="3454432" cy="1927372"/>
+          </a:xfrm>
+          <a:prstGeom prst="straightConnector1">
+            <a:avLst/>
+          </a:prstGeom>
+          <a:ln>
+            <a:solidFill>
+              <a:schemeClr val="tx1"/>
+            </a:solidFill>
+            <a:tailEnd type="triangle"/>
+          </a:ln>
+        </p:spPr>
+        <p:style>
+          <a:lnRef idx="1">
+            <a:schemeClr val="accent1"/>
+          </a:lnRef>
+          <a:fillRef idx="0">
+            <a:schemeClr val="accent1"/>
+          </a:fillRef>
+          <a:effectRef idx="0">
+            <a:schemeClr val="accent1"/>
+          </a:effectRef>
+          <a:fontRef idx="minor">
+            <a:schemeClr val="tx1"/>
+          </a:fontRef>
+        </p:style>
+      </p:cxnSp>
+      <p:cxnSp>
+        <p:nvCxnSpPr>
+          <p:cNvPr id="46" name="Connecteur droit avec flèche 45">
+            <a:extLst>
+              <a:ext uri="{FF2B5EF4-FFF2-40B4-BE49-F238E27FC236}">
+                <a16:creationId xmlns:a16="http://schemas.microsoft.com/office/drawing/2014/main" id="{5671BEE4-FB42-5631-2B3F-DE8D883D4914}"/>
+              </a:ext>
+            </a:extLst>
+          </p:cNvPr>
+          <p:cNvCxnSpPr>
+            <a:cxnSpLocks/>
+          </p:cNvCxnSpPr>
+          <p:nvPr/>
+        </p:nvCxnSpPr>
+        <p:spPr>
+          <a:xfrm flipH="1">
+            <a:off x="7527718" y="3428999"/>
+            <a:ext cx="3396624" cy="1927372"/>
+          </a:xfrm>
+          <a:prstGeom prst="straightConnector1">
+            <a:avLst/>
+          </a:prstGeom>
+          <a:ln>
+            <a:solidFill>
+              <a:schemeClr val="tx1"/>
+            </a:solidFill>
+            <a:tailEnd type="triangle"/>
+          </a:ln>
+        </p:spPr>
+        <p:style>
+          <a:lnRef idx="1">
+            <a:schemeClr val="accent1"/>
+          </a:lnRef>
+          <a:fillRef idx="0">
+            <a:schemeClr val="accent1"/>
+          </a:fillRef>
+          <a:effectRef idx="0">
+            <a:schemeClr val="accent1"/>
+          </a:effectRef>
+          <a:fontRef idx="minor">
+            <a:schemeClr val="tx1"/>
+          </a:fontRef>
+        </p:style>
+      </p:cxnSp>
+      <p:cxnSp>
+        <p:nvCxnSpPr>
+          <p:cNvPr id="49" name="Connecteur droit avec flèche 48">
+            <a:extLst>
+              <a:ext uri="{FF2B5EF4-FFF2-40B4-BE49-F238E27FC236}">
+                <a16:creationId xmlns:a16="http://schemas.microsoft.com/office/drawing/2014/main" id="{F12C3D81-87DE-9428-2425-64CF2B061767}"/>
+              </a:ext>
+            </a:extLst>
+          </p:cNvPr>
+          <p:cNvCxnSpPr>
+            <a:cxnSpLocks/>
+          </p:cNvCxnSpPr>
+          <p:nvPr/>
+        </p:nvCxnSpPr>
+        <p:spPr>
+          <a:xfrm>
+            <a:off x="1728132" y="3581399"/>
+            <a:ext cx="2936147" cy="0"/>
+          </a:xfrm>
+          <a:prstGeom prst="straightConnector1">
+            <a:avLst/>
+          </a:prstGeom>
+          <a:ln>
+            <a:solidFill>
+              <a:schemeClr val="tx1"/>
+            </a:solidFill>
+            <a:tailEnd type="triangle"/>
+          </a:ln>
+        </p:spPr>
+        <p:style>
+          <a:lnRef idx="1">
+            <a:schemeClr val="accent1"/>
+          </a:lnRef>
+          <a:fillRef idx="0">
+            <a:schemeClr val="accent1"/>
+          </a:fillRef>
+          <a:effectRef idx="0">
+            <a:schemeClr val="accent1"/>
+          </a:effectRef>
+          <a:fontRef idx="minor">
+            <a:schemeClr val="tx1"/>
+          </a:fontRef>
+        </p:style>
+      </p:cxnSp>
+      <p:cxnSp>
+        <p:nvCxnSpPr>
+          <p:cNvPr id="50" name="Connecteur droit avec flèche 49">
+            <a:extLst>
+              <a:ext uri="{FF2B5EF4-FFF2-40B4-BE49-F238E27FC236}">
+                <a16:creationId xmlns:a16="http://schemas.microsoft.com/office/drawing/2014/main" id="{AD3FAC20-30FA-733E-51EF-C852DF01E49D}"/>
+              </a:ext>
+            </a:extLst>
+          </p:cNvPr>
+          <p:cNvCxnSpPr>
+            <a:cxnSpLocks/>
+          </p:cNvCxnSpPr>
+          <p:nvPr/>
+        </p:nvCxnSpPr>
+        <p:spPr>
+          <a:xfrm flipH="1">
+            <a:off x="7527717" y="3589088"/>
+            <a:ext cx="2924966" cy="0"/>
+          </a:xfrm>
+          <a:prstGeom prst="straightConnector1">
+            <a:avLst/>
+          </a:prstGeom>
+          <a:ln>
+            <a:solidFill>
+              <a:schemeClr val="tx1"/>
+            </a:solidFill>
+            <a:tailEnd type="triangle"/>
+          </a:ln>
+        </p:spPr>
+        <p:style>
+          <a:lnRef idx="1">
+            <a:schemeClr val="accent1"/>
+          </a:lnRef>
+          <a:fillRef idx="0">
+            <a:schemeClr val="accent1"/>
+          </a:fillRef>
+          <a:effectRef idx="0">
+            <a:schemeClr val="accent1"/>
+          </a:effectRef>
+          <a:fontRef idx="minor">
+            <a:schemeClr val="tx1"/>
+          </a:fontRef>
+        </p:style>
+      </p:cxnSp>
+      <p:sp>
+        <p:nvSpPr>
+          <p:cNvPr id="51" name="ZoneTexte 50">
+            <a:extLst>
+              <a:ext uri="{FF2B5EF4-FFF2-40B4-BE49-F238E27FC236}">
+                <a16:creationId xmlns:a16="http://schemas.microsoft.com/office/drawing/2014/main" id="{E65C9E8B-CB18-1E96-9A08-906308A9F60B}"/>
+              </a:ext>
+            </a:extLst>
+          </p:cNvPr>
+          <p:cNvSpPr txBox="1"/>
+          <p:nvPr/>
+        </p:nvSpPr>
+        <p:spPr>
+          <a:xfrm>
+            <a:off x="2144185" y="2084785"/>
+            <a:ext cx="1073255" cy="307777"/>
+          </a:xfrm>
+          <a:prstGeom prst="rect">
+            <a:avLst/>
+          </a:prstGeom>
+          <a:noFill/>
+        </p:spPr>
+        <p:txBody>
+          <a:bodyPr wrap="square" rtlCol="0">
+            <a:spAutoFit/>
+          </a:bodyPr>
+          <a:lstStyle/>
+          <a:p>
+            <a:r>
+              <a:rPr lang="fr-FR" sz="1400" dirty="0"/>
+              <a:t>Sélectionne</a:t>
+            </a:r>
+          </a:p>
+        </p:txBody>
+      </p:sp>
+      <p:sp>
+        <p:nvSpPr>
+          <p:cNvPr id="54" name="ZoneTexte 53">
+            <a:extLst>
+              <a:ext uri="{FF2B5EF4-FFF2-40B4-BE49-F238E27FC236}">
+                <a16:creationId xmlns:a16="http://schemas.microsoft.com/office/drawing/2014/main" id="{8D2FF79B-279C-BC93-5411-DD956E2BA842}"/>
+              </a:ext>
+            </a:extLst>
+          </p:cNvPr>
+          <p:cNvSpPr txBox="1"/>
+          <p:nvPr/>
+        </p:nvSpPr>
+        <p:spPr>
+          <a:xfrm>
+            <a:off x="5519874" y="2333002"/>
+            <a:ext cx="715942" cy="307777"/>
+          </a:xfrm>
+          <a:prstGeom prst="rect">
+            <a:avLst/>
+          </a:prstGeom>
+          <a:noFill/>
+        </p:spPr>
+        <p:txBody>
+          <a:bodyPr wrap="square" rtlCol="0">
+            <a:spAutoFit/>
+          </a:bodyPr>
+          <a:lstStyle/>
+          <a:p>
+            <a:r>
+              <a:rPr lang="fr-FR" sz="1400" dirty="0"/>
+              <a:t>Crée</a:t>
+            </a:r>
+          </a:p>
+        </p:txBody>
+      </p:sp>
+      <p:sp>
+        <p:nvSpPr>
+          <p:cNvPr id="55" name="ZoneTexte 54">
+            <a:extLst>
+              <a:ext uri="{FF2B5EF4-FFF2-40B4-BE49-F238E27FC236}">
+                <a16:creationId xmlns:a16="http://schemas.microsoft.com/office/drawing/2014/main" id="{03831CF4-A671-D904-A9D7-AD9DD28EF5A3}"/>
+              </a:ext>
+            </a:extLst>
+          </p:cNvPr>
+          <p:cNvSpPr txBox="1"/>
+          <p:nvPr/>
+        </p:nvSpPr>
+        <p:spPr>
+          <a:xfrm>
+            <a:off x="2057748" y="2998274"/>
+            <a:ext cx="2463922" cy="307777"/>
+          </a:xfrm>
+          <a:prstGeom prst="rect">
+            <a:avLst/>
+          </a:prstGeom>
+          <a:noFill/>
+        </p:spPr>
+        <p:txBody>
+          <a:bodyPr wrap="square" rtlCol="0">
+            <a:spAutoFit/>
+          </a:bodyPr>
+          <a:lstStyle/>
+          <a:p>
+            <a:r>
+              <a:rPr lang="fr-FR" sz="1400" dirty="0"/>
+              <a:t>Notification à chaque message </a:t>
+            </a:r>
+          </a:p>
+        </p:txBody>
+      </p:sp>
+      <p:sp>
+        <p:nvSpPr>
+          <p:cNvPr id="56" name="ZoneTexte 55">
+            <a:extLst>
+              <a:ext uri="{FF2B5EF4-FFF2-40B4-BE49-F238E27FC236}">
+                <a16:creationId xmlns:a16="http://schemas.microsoft.com/office/drawing/2014/main" id="{46E154D9-0A5C-12B5-AABA-0BD5D0DE9AEA}"/>
+              </a:ext>
+            </a:extLst>
+          </p:cNvPr>
+          <p:cNvSpPr txBox="1"/>
+          <p:nvPr/>
+        </p:nvSpPr>
+        <p:spPr>
+          <a:xfrm>
+            <a:off x="7804377" y="2998273"/>
+            <a:ext cx="2463922" cy="307777"/>
+          </a:xfrm>
+          <a:prstGeom prst="rect">
+            <a:avLst/>
+          </a:prstGeom>
+          <a:noFill/>
+        </p:spPr>
+        <p:txBody>
+          <a:bodyPr wrap="square" rtlCol="0">
+            <a:spAutoFit/>
+          </a:bodyPr>
+          <a:lstStyle/>
+          <a:p>
+            <a:r>
+              <a:rPr lang="fr-FR" sz="1400" dirty="0"/>
+              <a:t>Notification à chaque message </a:t>
+            </a:r>
+          </a:p>
+        </p:txBody>
+      </p:sp>
+      <p:sp>
+        <p:nvSpPr>
+          <p:cNvPr id="57" name="ZoneTexte 56">
+            <a:extLst>
+              <a:ext uri="{FF2B5EF4-FFF2-40B4-BE49-F238E27FC236}">
+                <a16:creationId xmlns:a16="http://schemas.microsoft.com/office/drawing/2014/main" id="{E161190A-4B6B-C9F7-0A3E-27109D89ADFC}"/>
+              </a:ext>
+            </a:extLst>
+          </p:cNvPr>
+          <p:cNvSpPr txBox="1"/>
+          <p:nvPr/>
+        </p:nvSpPr>
+        <p:spPr>
+          <a:xfrm>
+            <a:off x="2325312" y="3609125"/>
+            <a:ext cx="1658670" cy="307777"/>
+          </a:xfrm>
+          <a:prstGeom prst="rect">
+            <a:avLst/>
+          </a:prstGeom>
+          <a:noFill/>
+        </p:spPr>
+        <p:txBody>
+          <a:bodyPr wrap="square" rtlCol="0">
+            <a:spAutoFit/>
+          </a:bodyPr>
+          <a:lstStyle/>
+          <a:p>
+            <a:r>
+              <a:rPr lang="fr-FR" sz="1400" dirty="0"/>
+              <a:t>Consulte / supprime</a:t>
+            </a:r>
+          </a:p>
+        </p:txBody>
+      </p:sp>
+      <p:sp>
+        <p:nvSpPr>
+          <p:cNvPr id="58" name="ZoneTexte 57">
+            <a:extLst>
+              <a:ext uri="{FF2B5EF4-FFF2-40B4-BE49-F238E27FC236}">
+                <a16:creationId xmlns:a16="http://schemas.microsoft.com/office/drawing/2014/main" id="{7B57DE3F-17AF-DFE7-8DB2-684BEDE03866}"/>
+              </a:ext>
+            </a:extLst>
+          </p:cNvPr>
+          <p:cNvSpPr txBox="1"/>
+          <p:nvPr/>
+        </p:nvSpPr>
+        <p:spPr>
+          <a:xfrm>
+            <a:off x="8207003" y="3609125"/>
+            <a:ext cx="1658670" cy="307777"/>
+          </a:xfrm>
+          <a:prstGeom prst="rect">
+            <a:avLst/>
+          </a:prstGeom>
+          <a:noFill/>
+        </p:spPr>
+        <p:txBody>
+          <a:bodyPr wrap="square" rtlCol="0">
+            <a:spAutoFit/>
+          </a:bodyPr>
+          <a:lstStyle/>
+          <a:p>
+            <a:r>
+              <a:rPr lang="fr-FR" sz="1400" dirty="0"/>
+              <a:t>Consulte / supprime</a:t>
+            </a:r>
+          </a:p>
+        </p:txBody>
+      </p:sp>
+      <p:sp>
+        <p:nvSpPr>
+          <p:cNvPr id="61" name="ZoneTexte 60">
+            <a:extLst>
+              <a:ext uri="{FF2B5EF4-FFF2-40B4-BE49-F238E27FC236}">
+                <a16:creationId xmlns:a16="http://schemas.microsoft.com/office/drawing/2014/main" id="{408C6C58-6E99-8DA3-4A1D-C6165883E1B4}"/>
+              </a:ext>
+            </a:extLst>
+          </p:cNvPr>
+          <p:cNvSpPr txBox="1"/>
+          <p:nvPr/>
+        </p:nvSpPr>
+        <p:spPr>
+          <a:xfrm>
+            <a:off x="2400434" y="4482748"/>
+            <a:ext cx="1073255" cy="307777"/>
+          </a:xfrm>
+          <a:prstGeom prst="rect">
+            <a:avLst/>
+          </a:prstGeom>
+          <a:noFill/>
+        </p:spPr>
+        <p:txBody>
+          <a:bodyPr wrap="square" rtlCol="0">
+            <a:spAutoFit/>
+          </a:bodyPr>
+          <a:lstStyle/>
+          <a:p>
+            <a:r>
+              <a:rPr lang="fr-FR" sz="1400" dirty="0"/>
+              <a:t>Rédige</a:t>
+            </a:r>
+          </a:p>
+        </p:txBody>
+      </p:sp>
+      <p:sp>
+        <p:nvSpPr>
+          <p:cNvPr id="62" name="ZoneTexte 61">
+            <a:extLst>
+              <a:ext uri="{FF2B5EF4-FFF2-40B4-BE49-F238E27FC236}">
+                <a16:creationId xmlns:a16="http://schemas.microsoft.com/office/drawing/2014/main" id="{803A3A81-896B-93D9-5B65-FE9AF8A00F24}"/>
+              </a:ext>
+            </a:extLst>
+          </p:cNvPr>
+          <p:cNvSpPr txBox="1"/>
+          <p:nvPr/>
+        </p:nvSpPr>
+        <p:spPr>
+          <a:xfrm>
+            <a:off x="9036338" y="4482748"/>
+            <a:ext cx="1073255" cy="307777"/>
+          </a:xfrm>
+          <a:prstGeom prst="rect">
+            <a:avLst/>
+          </a:prstGeom>
+          <a:noFill/>
+        </p:spPr>
+        <p:txBody>
+          <a:bodyPr wrap="square" rtlCol="0">
+            <a:spAutoFit/>
+          </a:bodyPr>
+          <a:lstStyle/>
+          <a:p>
+            <a:r>
+              <a:rPr lang="fr-FR" sz="1400" dirty="0"/>
+              <a:t>Rédige</a:t>
+            </a:r>
+          </a:p>
+        </p:txBody>
+      </p:sp>
+      <p:cxnSp>
+        <p:nvCxnSpPr>
+          <p:cNvPr id="64" name="Connecteur droit avec flèche 63">
+            <a:extLst>
+              <a:ext uri="{FF2B5EF4-FFF2-40B4-BE49-F238E27FC236}">
+                <a16:creationId xmlns:a16="http://schemas.microsoft.com/office/drawing/2014/main" id="{C12C6688-7F20-C46E-3F30-3593C138C789}"/>
+              </a:ext>
+            </a:extLst>
+          </p:cNvPr>
+          <p:cNvCxnSpPr>
+            <a:cxnSpLocks/>
+            <a:stCxn id="9" idx="2"/>
+            <a:endCxn id="65" idx="3"/>
+          </p:cNvCxnSpPr>
+          <p:nvPr/>
+        </p:nvCxnSpPr>
+        <p:spPr>
+          <a:xfrm flipH="1">
+            <a:off x="2694262" y="3705836"/>
+            <a:ext cx="3401737" cy="2245550"/>
+          </a:xfrm>
+          <a:prstGeom prst="straightConnector1">
+            <a:avLst/>
+          </a:prstGeom>
+          <a:ln>
+            <a:solidFill>
+              <a:schemeClr val="tx1"/>
+            </a:solidFill>
+            <a:tailEnd type="triangle"/>
+          </a:ln>
+        </p:spPr>
+        <p:style>
+          <a:lnRef idx="1">
+            <a:schemeClr val="accent1"/>
+          </a:lnRef>
+          <a:fillRef idx="0">
+            <a:schemeClr val="accent1"/>
+          </a:fillRef>
+          <a:effectRef idx="0">
+            <a:schemeClr val="accent1"/>
+          </a:effectRef>
+          <a:fontRef idx="minor">
+            <a:schemeClr val="tx1"/>
+          </a:fontRef>
+        </p:style>
+      </p:cxnSp>
+      <p:sp>
+        <p:nvSpPr>
+          <p:cNvPr id="65" name="Rectangle 64">
+            <a:extLst>
+              <a:ext uri="{FF2B5EF4-FFF2-40B4-BE49-F238E27FC236}">
+                <a16:creationId xmlns:a16="http://schemas.microsoft.com/office/drawing/2014/main" id="{23288240-1019-F3D9-E108-96FBC4C85AB2}"/>
+              </a:ext>
+            </a:extLst>
+          </p:cNvPr>
+          <p:cNvSpPr/>
+          <p:nvPr/>
+        </p:nvSpPr>
+        <p:spPr>
+          <a:xfrm>
+            <a:off x="564475" y="5604292"/>
+            <a:ext cx="2129787" cy="694187"/>
+          </a:xfrm>
+          <a:prstGeom prst="rect">
+            <a:avLst/>
+          </a:prstGeom>
+          <a:solidFill>
+            <a:srgbClr val="00B050"/>
+          </a:solidFill>
+          <a:ln>
+            <a:solidFill>
+              <a:srgbClr val="00B050"/>
+            </a:solidFill>
+          </a:ln>
+        </p:spPr>
+        <p:style>
+          <a:lnRef idx="2">
+            <a:schemeClr val="accent1">
+              <a:shade val="50000"/>
+            </a:schemeClr>
+          </a:lnRef>
+          <a:fillRef idx="1">
+            <a:schemeClr val="accent1"/>
+          </a:fillRef>
+          <a:effectRef idx="0">
+            <a:schemeClr val="accent1"/>
+          </a:effectRef>
+          <a:fontRef idx="minor">
+            <a:schemeClr val="lt1"/>
+          </a:fontRef>
+        </p:style>
+        <p:txBody>
+          <a:bodyPr rtlCol="0" anchor="ctr"/>
+          <a:lstStyle/>
+          <a:p>
+            <a:pPr algn="ctr"/>
+            <a:r>
+              <a:rPr lang="fr-FR" dirty="0"/>
+              <a:t>Liste des conversations</a:t>
+            </a:r>
+          </a:p>
+        </p:txBody>
+      </p:sp>
+      <p:sp>
+        <p:nvSpPr>
+          <p:cNvPr id="66" name="ZoneTexte 65">
+            <a:extLst>
+              <a:ext uri="{FF2B5EF4-FFF2-40B4-BE49-F238E27FC236}">
+                <a16:creationId xmlns:a16="http://schemas.microsoft.com/office/drawing/2014/main" id="{EB55B90B-6B4D-79E5-6797-9B013B3CA4C6}"/>
+              </a:ext>
+            </a:extLst>
+          </p:cNvPr>
+          <p:cNvSpPr txBox="1"/>
+          <p:nvPr/>
+        </p:nvSpPr>
+        <p:spPr>
+          <a:xfrm>
+            <a:off x="2854036" y="5733796"/>
+            <a:ext cx="1073255" cy="307777"/>
+          </a:xfrm>
+          <a:prstGeom prst="rect">
+            <a:avLst/>
+          </a:prstGeom>
+          <a:noFill/>
+        </p:spPr>
+        <p:txBody>
+          <a:bodyPr wrap="square" rtlCol="0">
+            <a:spAutoFit/>
+          </a:bodyPr>
+          <a:lstStyle/>
+          <a:p>
+            <a:r>
+              <a:rPr lang="fr-FR" sz="1400" dirty="0"/>
+              <a:t>Met à jour</a:t>
+            </a:r>
+          </a:p>
+        </p:txBody>
+      </p:sp>
+      <p:sp>
+        <p:nvSpPr>
+          <p:cNvPr id="72" name="Rectangle 71">
+            <a:extLst>
+              <a:ext uri="{FF2B5EF4-FFF2-40B4-BE49-F238E27FC236}">
+                <a16:creationId xmlns:a16="http://schemas.microsoft.com/office/drawing/2014/main" id="{C5A71777-0329-D5D8-A209-EC9AF8E663E7}"/>
+              </a:ext>
+            </a:extLst>
+          </p:cNvPr>
+          <p:cNvSpPr/>
+          <p:nvPr/>
+        </p:nvSpPr>
+        <p:spPr>
+          <a:xfrm>
+            <a:off x="9550430" y="5596759"/>
+            <a:ext cx="2129787" cy="694187"/>
+          </a:xfrm>
+          <a:prstGeom prst="rect">
+            <a:avLst/>
+          </a:prstGeom>
+          <a:solidFill>
+            <a:srgbClr val="00B050"/>
+          </a:solidFill>
+          <a:ln>
+            <a:solidFill>
+              <a:srgbClr val="00B050"/>
+            </a:solidFill>
+          </a:ln>
+        </p:spPr>
+        <p:style>
+          <a:lnRef idx="2">
+            <a:schemeClr val="accent1">
+              <a:shade val="50000"/>
+            </a:schemeClr>
+          </a:lnRef>
+          <a:fillRef idx="1">
+            <a:schemeClr val="accent1"/>
+          </a:fillRef>
+          <a:effectRef idx="0">
+            <a:schemeClr val="accent1"/>
+          </a:effectRef>
+          <a:fontRef idx="minor">
+            <a:schemeClr val="lt1"/>
+          </a:fontRef>
+        </p:style>
+        <p:txBody>
+          <a:bodyPr rtlCol="0" anchor="ctr"/>
+          <a:lstStyle/>
+          <a:p>
+            <a:pPr algn="ctr"/>
+            <a:r>
+              <a:rPr lang="fr-FR" dirty="0"/>
+              <a:t>Liste des conversations</a:t>
+            </a:r>
+          </a:p>
+        </p:txBody>
+      </p:sp>
+      <p:cxnSp>
+        <p:nvCxnSpPr>
+          <p:cNvPr id="73" name="Connecteur droit avec flèche 72">
+            <a:extLst>
+              <a:ext uri="{FF2B5EF4-FFF2-40B4-BE49-F238E27FC236}">
+                <a16:creationId xmlns:a16="http://schemas.microsoft.com/office/drawing/2014/main" id="{1327BFC1-D2A8-BF60-C9A1-F527B66BDB3A}"/>
+              </a:ext>
+            </a:extLst>
+          </p:cNvPr>
+          <p:cNvCxnSpPr>
+            <a:cxnSpLocks/>
+            <a:stCxn id="9" idx="2"/>
+            <a:endCxn id="72" idx="1"/>
+          </p:cNvCxnSpPr>
+          <p:nvPr/>
+        </p:nvCxnSpPr>
+        <p:spPr>
+          <a:xfrm>
+            <a:off x="6095999" y="3705836"/>
+            <a:ext cx="3454431" cy="2238017"/>
+          </a:xfrm>
+          <a:prstGeom prst="straightConnector1">
+            <a:avLst/>
+          </a:prstGeom>
+          <a:ln>
+            <a:solidFill>
+              <a:schemeClr val="tx1"/>
+            </a:solidFill>
+            <a:tailEnd type="triangle"/>
+          </a:ln>
+        </p:spPr>
+        <p:style>
+          <a:lnRef idx="1">
+            <a:schemeClr val="accent1"/>
+          </a:lnRef>
+          <a:fillRef idx="0">
+            <a:schemeClr val="accent1"/>
+          </a:fillRef>
+          <a:effectRef idx="0">
+            <a:schemeClr val="accent1"/>
+          </a:effectRef>
+          <a:fontRef idx="minor">
+            <a:schemeClr val="tx1"/>
+          </a:fontRef>
+        </p:style>
+      </p:cxnSp>
+      <p:sp>
+        <p:nvSpPr>
+          <p:cNvPr id="76" name="ZoneTexte 75">
+            <a:extLst>
+              <a:ext uri="{FF2B5EF4-FFF2-40B4-BE49-F238E27FC236}">
+                <a16:creationId xmlns:a16="http://schemas.microsoft.com/office/drawing/2014/main" id="{4BCCDE24-AB11-9ADD-3B99-FD4453D66B28}"/>
+              </a:ext>
+            </a:extLst>
+          </p:cNvPr>
+          <p:cNvSpPr txBox="1"/>
+          <p:nvPr/>
+        </p:nvSpPr>
+        <p:spPr>
+          <a:xfrm>
+            <a:off x="8317401" y="5733796"/>
+            <a:ext cx="1073255" cy="307777"/>
+          </a:xfrm>
+          <a:prstGeom prst="rect">
+            <a:avLst/>
+          </a:prstGeom>
+          <a:noFill/>
+        </p:spPr>
+        <p:txBody>
+          <a:bodyPr wrap="square" rtlCol="0">
+            <a:spAutoFit/>
+          </a:bodyPr>
+          <a:lstStyle/>
+          <a:p>
+            <a:r>
+              <a:rPr lang="fr-FR" sz="1400" dirty="0"/>
+              <a:t>Met à jour</a:t>
             </a:r>
           </a:p>
         </p:txBody>
@@ -8603,6 +9868,1183 @@
           </a:p>
         </p:txBody>
       </p:sp>
+      <p:pic>
+        <p:nvPicPr>
+          <p:cNvPr id="2" name="Image 1">
+            <a:extLst>
+              <a:ext uri="{FF2B5EF4-FFF2-40B4-BE49-F238E27FC236}">
+                <a16:creationId xmlns:a16="http://schemas.microsoft.com/office/drawing/2014/main" id="{8DFAD444-E330-37FC-96D2-1E732272B9FA}"/>
+              </a:ext>
+            </a:extLst>
+          </p:cNvPr>
+          <p:cNvPicPr>
+            <a:picLocks noChangeAspect="1"/>
+          </p:cNvPicPr>
+          <p:nvPr/>
+        </p:nvPicPr>
+        <p:blipFill>
+          <a:blip r:embed="rId2"/>
+          <a:stretch>
+            <a:fillRect/>
+          </a:stretch>
+        </p:blipFill>
+        <p:spPr>
+          <a:xfrm>
+            <a:off x="361952" y="2486891"/>
+            <a:ext cx="847898" cy="1884218"/>
+          </a:xfrm>
+          <a:prstGeom prst="rect">
+            <a:avLst/>
+          </a:prstGeom>
+        </p:spPr>
+      </p:pic>
+      <p:sp>
+        <p:nvSpPr>
+          <p:cNvPr id="3" name="ZoneTexte 2">
+            <a:extLst>
+              <a:ext uri="{FF2B5EF4-FFF2-40B4-BE49-F238E27FC236}">
+                <a16:creationId xmlns:a16="http://schemas.microsoft.com/office/drawing/2014/main" id="{D29BD1B0-D69C-3F72-A722-73301FF0BA54}"/>
+              </a:ext>
+            </a:extLst>
+          </p:cNvPr>
+          <p:cNvSpPr txBox="1"/>
+          <p:nvPr/>
+        </p:nvSpPr>
+        <p:spPr>
+          <a:xfrm>
+            <a:off x="283212" y="2012088"/>
+            <a:ext cx="1005378" cy="369332"/>
+          </a:xfrm>
+          <a:prstGeom prst="rect">
+            <a:avLst/>
+          </a:prstGeom>
+          <a:noFill/>
+        </p:spPr>
+        <p:txBody>
+          <a:bodyPr wrap="square" rtlCol="0">
+            <a:spAutoFit/>
+          </a:bodyPr>
+          <a:lstStyle/>
+          <a:p>
+            <a:pPr algn="ctr"/>
+            <a:r>
+              <a:rPr lang="fr-FR" dirty="0">
+                <a:solidFill>
+                  <a:srgbClr val="D83950"/>
+                </a:solidFill>
+              </a:rPr>
+              <a:t>Élève</a:t>
+            </a:r>
+          </a:p>
+        </p:txBody>
+      </p:sp>
+      <p:sp>
+        <p:nvSpPr>
+          <p:cNvPr id="6" name="ZoneTexte 5">
+            <a:extLst>
+              <a:ext uri="{FF2B5EF4-FFF2-40B4-BE49-F238E27FC236}">
+                <a16:creationId xmlns:a16="http://schemas.microsoft.com/office/drawing/2014/main" id="{78888F2A-595A-B762-B233-13FB76BE1DA1}"/>
+              </a:ext>
+            </a:extLst>
+          </p:cNvPr>
+          <p:cNvSpPr txBox="1"/>
+          <p:nvPr/>
+        </p:nvSpPr>
+        <p:spPr>
+          <a:xfrm>
+            <a:off x="10664320" y="2012088"/>
+            <a:ext cx="1483558" cy="369332"/>
+          </a:xfrm>
+          <a:prstGeom prst="rect">
+            <a:avLst/>
+          </a:prstGeom>
+          <a:noFill/>
+        </p:spPr>
+        <p:txBody>
+          <a:bodyPr wrap="square" rtlCol="0">
+            <a:spAutoFit/>
+          </a:bodyPr>
+          <a:lstStyle/>
+          <a:p>
+            <a:pPr algn="ctr"/>
+            <a:r>
+              <a:rPr lang="fr-FR" dirty="0">
+                <a:solidFill>
+                  <a:srgbClr val="D83950"/>
+                </a:solidFill>
+              </a:rPr>
+              <a:t>Pédagogue</a:t>
+            </a:r>
+          </a:p>
+        </p:txBody>
+      </p:sp>
+      <p:pic>
+        <p:nvPicPr>
+          <p:cNvPr id="7" name="Image 6">
+            <a:extLst>
+              <a:ext uri="{FF2B5EF4-FFF2-40B4-BE49-F238E27FC236}">
+                <a16:creationId xmlns:a16="http://schemas.microsoft.com/office/drawing/2014/main" id="{5443BB1E-43B4-73D4-6E9D-B6BF23C77B5C}"/>
+              </a:ext>
+            </a:extLst>
+          </p:cNvPr>
+          <p:cNvPicPr>
+            <a:picLocks noChangeAspect="1"/>
+          </p:cNvPicPr>
+          <p:nvPr/>
+        </p:nvPicPr>
+        <p:blipFill>
+          <a:blip r:embed="rId2"/>
+          <a:stretch>
+            <a:fillRect/>
+          </a:stretch>
+        </p:blipFill>
+        <p:spPr>
+          <a:xfrm>
+            <a:off x="10982150" y="2486891"/>
+            <a:ext cx="847898" cy="1884218"/>
+          </a:xfrm>
+          <a:prstGeom prst="rect">
+            <a:avLst/>
+          </a:prstGeom>
+        </p:spPr>
+      </p:pic>
+      <p:sp>
+        <p:nvSpPr>
+          <p:cNvPr id="8" name="Rectangle 7">
+            <a:extLst>
+              <a:ext uri="{FF2B5EF4-FFF2-40B4-BE49-F238E27FC236}">
+                <a16:creationId xmlns:a16="http://schemas.microsoft.com/office/drawing/2014/main" id="{F967F4E0-2E50-B2CF-CABC-E3A79DADF190}"/>
+              </a:ext>
+            </a:extLst>
+          </p:cNvPr>
+          <p:cNvSpPr/>
+          <p:nvPr/>
+        </p:nvSpPr>
+        <p:spPr>
+          <a:xfrm>
+            <a:off x="4762149" y="3078759"/>
+            <a:ext cx="2667699" cy="553673"/>
+          </a:xfrm>
+          <a:prstGeom prst="rect">
+            <a:avLst/>
+          </a:prstGeom>
+          <a:solidFill>
+            <a:srgbClr val="D83950"/>
+          </a:solidFill>
+          <a:ln>
+            <a:solidFill>
+              <a:srgbClr val="D83950"/>
+            </a:solidFill>
+          </a:ln>
+        </p:spPr>
+        <p:style>
+          <a:lnRef idx="2">
+            <a:schemeClr val="accent1">
+              <a:shade val="50000"/>
+            </a:schemeClr>
+          </a:lnRef>
+          <a:fillRef idx="1">
+            <a:schemeClr val="accent1"/>
+          </a:fillRef>
+          <a:effectRef idx="0">
+            <a:schemeClr val="accent1"/>
+          </a:effectRef>
+          <a:fontRef idx="minor">
+            <a:schemeClr val="lt1"/>
+          </a:fontRef>
+        </p:style>
+        <p:txBody>
+          <a:bodyPr rtlCol="0" anchor="ctr"/>
+          <a:lstStyle/>
+          <a:p>
+            <a:pPr algn="ctr"/>
+            <a:r>
+              <a:rPr lang="fr-FR" sz="1400" dirty="0"/>
+              <a:t>Calendrier</a:t>
+            </a:r>
+          </a:p>
+        </p:txBody>
+      </p:sp>
+      <p:sp>
+        <p:nvSpPr>
+          <p:cNvPr id="9" name="Rectangle 8">
+            <a:extLst>
+              <a:ext uri="{FF2B5EF4-FFF2-40B4-BE49-F238E27FC236}">
+                <a16:creationId xmlns:a16="http://schemas.microsoft.com/office/drawing/2014/main" id="{C9E01899-561C-9A1D-63BE-F118F72981E5}"/>
+              </a:ext>
+            </a:extLst>
+          </p:cNvPr>
+          <p:cNvSpPr/>
+          <p:nvPr/>
+        </p:nvSpPr>
+        <p:spPr>
+          <a:xfrm>
+            <a:off x="4762148" y="1247861"/>
+            <a:ext cx="2667699" cy="553673"/>
+          </a:xfrm>
+          <a:prstGeom prst="rect">
+            <a:avLst/>
+          </a:prstGeom>
+          <a:solidFill>
+            <a:srgbClr val="D83950"/>
+          </a:solidFill>
+          <a:ln>
+            <a:solidFill>
+              <a:srgbClr val="D83950"/>
+            </a:solidFill>
+          </a:ln>
+        </p:spPr>
+        <p:style>
+          <a:lnRef idx="2">
+            <a:schemeClr val="accent1">
+              <a:shade val="50000"/>
+            </a:schemeClr>
+          </a:lnRef>
+          <a:fillRef idx="1">
+            <a:schemeClr val="accent1"/>
+          </a:fillRef>
+          <a:effectRef idx="0">
+            <a:schemeClr val="accent1"/>
+          </a:effectRef>
+          <a:fontRef idx="minor">
+            <a:schemeClr val="lt1"/>
+          </a:fontRef>
+        </p:style>
+        <p:txBody>
+          <a:bodyPr rtlCol="0" anchor="ctr"/>
+          <a:lstStyle/>
+          <a:p>
+            <a:pPr algn="ctr"/>
+            <a:r>
+              <a:rPr lang="fr-FR" sz="1400" dirty="0"/>
+              <a:t>Évènement</a:t>
+            </a:r>
+          </a:p>
+        </p:txBody>
+      </p:sp>
+      <p:cxnSp>
+        <p:nvCxnSpPr>
+          <p:cNvPr id="10" name="Connecteur droit avec flèche 9">
+            <a:extLst>
+              <a:ext uri="{FF2B5EF4-FFF2-40B4-BE49-F238E27FC236}">
+                <a16:creationId xmlns:a16="http://schemas.microsoft.com/office/drawing/2014/main" id="{96DBBC5F-EEAE-206C-9395-49D184A1B7C8}"/>
+              </a:ext>
+            </a:extLst>
+          </p:cNvPr>
+          <p:cNvCxnSpPr>
+            <a:cxnSpLocks/>
+          </p:cNvCxnSpPr>
+          <p:nvPr/>
+        </p:nvCxnSpPr>
+        <p:spPr>
+          <a:xfrm flipV="1">
+            <a:off x="1288590" y="1501629"/>
+            <a:ext cx="3375689" cy="1770077"/>
+          </a:xfrm>
+          <a:prstGeom prst="straightConnector1">
+            <a:avLst/>
+          </a:prstGeom>
+          <a:ln>
+            <a:solidFill>
+              <a:schemeClr val="tx1"/>
+            </a:solidFill>
+            <a:tailEnd type="triangle"/>
+          </a:ln>
+        </p:spPr>
+        <p:style>
+          <a:lnRef idx="1">
+            <a:schemeClr val="accent1"/>
+          </a:lnRef>
+          <a:fillRef idx="0">
+            <a:schemeClr val="accent1"/>
+          </a:fillRef>
+          <a:effectRef idx="0">
+            <a:schemeClr val="accent1"/>
+          </a:effectRef>
+          <a:fontRef idx="minor">
+            <a:schemeClr val="tx1"/>
+          </a:fontRef>
+        </p:style>
+      </p:cxnSp>
+      <p:cxnSp>
+        <p:nvCxnSpPr>
+          <p:cNvPr id="12" name="Connecteur droit avec flèche 11">
+            <a:extLst>
+              <a:ext uri="{FF2B5EF4-FFF2-40B4-BE49-F238E27FC236}">
+                <a16:creationId xmlns:a16="http://schemas.microsoft.com/office/drawing/2014/main" id="{7C320A76-17F1-D94C-43B4-8BB8173797E5}"/>
+              </a:ext>
+            </a:extLst>
+          </p:cNvPr>
+          <p:cNvCxnSpPr>
+            <a:cxnSpLocks/>
+          </p:cNvCxnSpPr>
+          <p:nvPr/>
+        </p:nvCxnSpPr>
+        <p:spPr>
+          <a:xfrm flipH="1" flipV="1">
+            <a:off x="7527723" y="1501629"/>
+            <a:ext cx="3375687" cy="1770077"/>
+          </a:xfrm>
+          <a:prstGeom prst="straightConnector1">
+            <a:avLst/>
+          </a:prstGeom>
+          <a:ln>
+            <a:solidFill>
+              <a:schemeClr val="tx1"/>
+            </a:solidFill>
+            <a:tailEnd type="triangle"/>
+          </a:ln>
+        </p:spPr>
+        <p:style>
+          <a:lnRef idx="1">
+            <a:schemeClr val="accent1"/>
+          </a:lnRef>
+          <a:fillRef idx="0">
+            <a:schemeClr val="accent1"/>
+          </a:fillRef>
+          <a:effectRef idx="0">
+            <a:schemeClr val="accent1"/>
+          </a:effectRef>
+          <a:fontRef idx="minor">
+            <a:schemeClr val="tx1"/>
+          </a:fontRef>
+        </p:style>
+      </p:cxnSp>
+      <p:sp>
+        <p:nvSpPr>
+          <p:cNvPr id="15" name="Rectangle 14">
+            <a:extLst>
+              <a:ext uri="{FF2B5EF4-FFF2-40B4-BE49-F238E27FC236}">
+                <a16:creationId xmlns:a16="http://schemas.microsoft.com/office/drawing/2014/main" id="{0026F8D8-FAAA-D689-AAF3-9BB036EA7CE4}"/>
+              </a:ext>
+            </a:extLst>
+          </p:cNvPr>
+          <p:cNvSpPr/>
+          <p:nvPr/>
+        </p:nvSpPr>
+        <p:spPr>
+          <a:xfrm>
+            <a:off x="4762147" y="4779628"/>
+            <a:ext cx="2667699" cy="553673"/>
+          </a:xfrm>
+          <a:prstGeom prst="rect">
+            <a:avLst/>
+          </a:prstGeom>
+          <a:solidFill>
+            <a:srgbClr val="D83950"/>
+          </a:solidFill>
+          <a:ln>
+            <a:solidFill>
+              <a:srgbClr val="D83950"/>
+            </a:solidFill>
+          </a:ln>
+        </p:spPr>
+        <p:style>
+          <a:lnRef idx="2">
+            <a:schemeClr val="accent1">
+              <a:shade val="50000"/>
+            </a:schemeClr>
+          </a:lnRef>
+          <a:fillRef idx="1">
+            <a:schemeClr val="accent1"/>
+          </a:fillRef>
+          <a:effectRef idx="0">
+            <a:schemeClr val="accent1"/>
+          </a:effectRef>
+          <a:fontRef idx="minor">
+            <a:schemeClr val="lt1"/>
+          </a:fontRef>
+        </p:style>
+        <p:txBody>
+          <a:bodyPr rtlCol="0" anchor="ctr"/>
+          <a:lstStyle/>
+          <a:p>
+            <a:pPr algn="ctr"/>
+            <a:r>
+              <a:rPr lang="fr-FR" sz="1400" dirty="0"/>
+              <a:t>Évènement</a:t>
+            </a:r>
+          </a:p>
+        </p:txBody>
+      </p:sp>
+      <p:cxnSp>
+        <p:nvCxnSpPr>
+          <p:cNvPr id="16" name="Connecteur droit avec flèche 15">
+            <a:extLst>
+              <a:ext uri="{FF2B5EF4-FFF2-40B4-BE49-F238E27FC236}">
+                <a16:creationId xmlns:a16="http://schemas.microsoft.com/office/drawing/2014/main" id="{E446358C-AB6F-4D2F-EB5B-59E37639E0DE}"/>
+              </a:ext>
+            </a:extLst>
+          </p:cNvPr>
+          <p:cNvCxnSpPr>
+            <a:cxnSpLocks/>
+          </p:cNvCxnSpPr>
+          <p:nvPr/>
+        </p:nvCxnSpPr>
+        <p:spPr>
+          <a:xfrm flipH="1">
+            <a:off x="7527716" y="3502405"/>
+            <a:ext cx="3375425" cy="1554059"/>
+          </a:xfrm>
+          <a:prstGeom prst="straightConnector1">
+            <a:avLst/>
+          </a:prstGeom>
+          <a:ln>
+            <a:solidFill>
+              <a:schemeClr val="tx1"/>
+            </a:solidFill>
+            <a:tailEnd type="triangle"/>
+          </a:ln>
+        </p:spPr>
+        <p:style>
+          <a:lnRef idx="1">
+            <a:schemeClr val="accent1"/>
+          </a:lnRef>
+          <a:fillRef idx="0">
+            <a:schemeClr val="accent1"/>
+          </a:fillRef>
+          <a:effectRef idx="0">
+            <a:schemeClr val="accent1"/>
+          </a:effectRef>
+          <a:fontRef idx="minor">
+            <a:schemeClr val="tx1"/>
+          </a:fontRef>
+        </p:style>
+      </p:cxnSp>
+      <p:cxnSp>
+        <p:nvCxnSpPr>
+          <p:cNvPr id="19" name="Connecteur droit avec flèche 18">
+            <a:extLst>
+              <a:ext uri="{FF2B5EF4-FFF2-40B4-BE49-F238E27FC236}">
+                <a16:creationId xmlns:a16="http://schemas.microsoft.com/office/drawing/2014/main" id="{2167A9F8-6BE9-46D4-1B84-AD483232DFE8}"/>
+              </a:ext>
+            </a:extLst>
+          </p:cNvPr>
+          <p:cNvCxnSpPr>
+            <a:cxnSpLocks/>
+          </p:cNvCxnSpPr>
+          <p:nvPr/>
+        </p:nvCxnSpPr>
+        <p:spPr>
+          <a:xfrm>
+            <a:off x="1307461" y="3502405"/>
+            <a:ext cx="3356811" cy="1554059"/>
+          </a:xfrm>
+          <a:prstGeom prst="straightConnector1">
+            <a:avLst/>
+          </a:prstGeom>
+          <a:ln>
+            <a:solidFill>
+              <a:schemeClr val="tx1"/>
+            </a:solidFill>
+            <a:tailEnd type="triangle"/>
+          </a:ln>
+        </p:spPr>
+        <p:style>
+          <a:lnRef idx="1">
+            <a:schemeClr val="accent1"/>
+          </a:lnRef>
+          <a:fillRef idx="0">
+            <a:schemeClr val="accent1"/>
+          </a:fillRef>
+          <a:effectRef idx="0">
+            <a:schemeClr val="accent1"/>
+          </a:effectRef>
+          <a:fontRef idx="minor">
+            <a:schemeClr val="tx1"/>
+          </a:fontRef>
+        </p:style>
+      </p:cxnSp>
+      <p:cxnSp>
+        <p:nvCxnSpPr>
+          <p:cNvPr id="23" name="Connecteur droit avec flèche 22">
+            <a:extLst>
+              <a:ext uri="{FF2B5EF4-FFF2-40B4-BE49-F238E27FC236}">
+                <a16:creationId xmlns:a16="http://schemas.microsoft.com/office/drawing/2014/main" id="{CFE061BD-DCE1-AB33-40DF-E0AA508264A0}"/>
+              </a:ext>
+            </a:extLst>
+          </p:cNvPr>
+          <p:cNvCxnSpPr>
+            <a:cxnSpLocks/>
+            <a:stCxn id="9" idx="2"/>
+            <a:endCxn id="8" idx="0"/>
+          </p:cNvCxnSpPr>
+          <p:nvPr/>
+        </p:nvCxnSpPr>
+        <p:spPr>
+          <a:xfrm>
+            <a:off x="6095998" y="1801534"/>
+            <a:ext cx="1" cy="1277225"/>
+          </a:xfrm>
+          <a:prstGeom prst="straightConnector1">
+            <a:avLst/>
+          </a:prstGeom>
+          <a:ln>
+            <a:solidFill>
+              <a:schemeClr val="tx1"/>
+            </a:solidFill>
+            <a:tailEnd type="triangle"/>
+          </a:ln>
+        </p:spPr>
+        <p:style>
+          <a:lnRef idx="1">
+            <a:schemeClr val="accent1"/>
+          </a:lnRef>
+          <a:fillRef idx="0">
+            <a:schemeClr val="accent1"/>
+          </a:fillRef>
+          <a:effectRef idx="0">
+            <a:schemeClr val="accent1"/>
+          </a:effectRef>
+          <a:fontRef idx="minor">
+            <a:schemeClr val="tx1"/>
+          </a:fontRef>
+        </p:style>
+      </p:cxnSp>
+      <p:cxnSp>
+        <p:nvCxnSpPr>
+          <p:cNvPr id="24" name="Connecteur droit avec flèche 23">
+            <a:extLst>
+              <a:ext uri="{FF2B5EF4-FFF2-40B4-BE49-F238E27FC236}">
+                <a16:creationId xmlns:a16="http://schemas.microsoft.com/office/drawing/2014/main" id="{8BAB536C-726E-7E94-5B38-479B98DCD9C7}"/>
+              </a:ext>
+            </a:extLst>
+          </p:cNvPr>
+          <p:cNvCxnSpPr>
+            <a:cxnSpLocks/>
+            <a:stCxn id="15" idx="0"/>
+            <a:endCxn id="8" idx="2"/>
+          </p:cNvCxnSpPr>
+          <p:nvPr/>
+        </p:nvCxnSpPr>
+        <p:spPr>
+          <a:xfrm flipV="1">
+            <a:off x="6095997" y="3632432"/>
+            <a:ext cx="2" cy="1147196"/>
+          </a:xfrm>
+          <a:prstGeom prst="straightConnector1">
+            <a:avLst/>
+          </a:prstGeom>
+          <a:ln>
+            <a:solidFill>
+              <a:schemeClr val="tx1"/>
+            </a:solidFill>
+            <a:tailEnd type="triangle"/>
+          </a:ln>
+        </p:spPr>
+        <p:style>
+          <a:lnRef idx="1">
+            <a:schemeClr val="accent1"/>
+          </a:lnRef>
+          <a:fillRef idx="0">
+            <a:schemeClr val="accent1"/>
+          </a:fillRef>
+          <a:effectRef idx="0">
+            <a:schemeClr val="accent1"/>
+          </a:effectRef>
+          <a:fontRef idx="minor">
+            <a:schemeClr val="tx1"/>
+          </a:fontRef>
+        </p:style>
+      </p:cxnSp>
+      <p:cxnSp>
+        <p:nvCxnSpPr>
+          <p:cNvPr id="36" name="Connecteur droit avec flèche 35">
+            <a:extLst>
+              <a:ext uri="{FF2B5EF4-FFF2-40B4-BE49-F238E27FC236}">
+                <a16:creationId xmlns:a16="http://schemas.microsoft.com/office/drawing/2014/main" id="{DB39D986-0065-1406-EC04-A7E079456E3C}"/>
+              </a:ext>
+            </a:extLst>
+          </p:cNvPr>
+          <p:cNvCxnSpPr/>
+          <p:nvPr/>
+        </p:nvCxnSpPr>
+        <p:spPr>
+          <a:xfrm>
+            <a:off x="1288590" y="3271706"/>
+            <a:ext cx="3375682" cy="0"/>
+          </a:xfrm>
+          <a:prstGeom prst="straightConnector1">
+            <a:avLst/>
+          </a:prstGeom>
+          <a:ln>
+            <a:solidFill>
+              <a:schemeClr val="tx1"/>
+            </a:solidFill>
+            <a:tailEnd type="triangle"/>
+          </a:ln>
+        </p:spPr>
+        <p:style>
+          <a:lnRef idx="1">
+            <a:schemeClr val="accent1"/>
+          </a:lnRef>
+          <a:fillRef idx="0">
+            <a:schemeClr val="accent1"/>
+          </a:fillRef>
+          <a:effectRef idx="0">
+            <a:schemeClr val="accent1"/>
+          </a:effectRef>
+          <a:fontRef idx="minor">
+            <a:schemeClr val="tx1"/>
+          </a:fontRef>
+        </p:style>
+      </p:cxnSp>
+      <p:cxnSp>
+        <p:nvCxnSpPr>
+          <p:cNvPr id="37" name="Connecteur droit avec flèche 36">
+            <a:extLst>
+              <a:ext uri="{FF2B5EF4-FFF2-40B4-BE49-F238E27FC236}">
+                <a16:creationId xmlns:a16="http://schemas.microsoft.com/office/drawing/2014/main" id="{D5E5C70B-4CEF-07C2-EED6-C601A5C45275}"/>
+              </a:ext>
+            </a:extLst>
+          </p:cNvPr>
+          <p:cNvCxnSpPr>
+            <a:cxnSpLocks/>
+          </p:cNvCxnSpPr>
+          <p:nvPr/>
+        </p:nvCxnSpPr>
+        <p:spPr>
+          <a:xfrm>
+            <a:off x="7527459" y="3503803"/>
+            <a:ext cx="3375682" cy="0"/>
+          </a:xfrm>
+          <a:prstGeom prst="straightConnector1">
+            <a:avLst/>
+          </a:prstGeom>
+          <a:ln>
+            <a:solidFill>
+              <a:schemeClr val="tx1"/>
+            </a:solidFill>
+            <a:tailEnd type="triangle"/>
+          </a:ln>
+        </p:spPr>
+        <p:style>
+          <a:lnRef idx="1">
+            <a:schemeClr val="accent1"/>
+          </a:lnRef>
+          <a:fillRef idx="0">
+            <a:schemeClr val="accent1"/>
+          </a:fillRef>
+          <a:effectRef idx="0">
+            <a:schemeClr val="accent1"/>
+          </a:effectRef>
+          <a:fontRef idx="minor">
+            <a:schemeClr val="tx1"/>
+          </a:fontRef>
+        </p:style>
+      </p:cxnSp>
+      <p:cxnSp>
+        <p:nvCxnSpPr>
+          <p:cNvPr id="39" name="Connecteur droit avec flèche 38">
+            <a:extLst>
+              <a:ext uri="{FF2B5EF4-FFF2-40B4-BE49-F238E27FC236}">
+                <a16:creationId xmlns:a16="http://schemas.microsoft.com/office/drawing/2014/main" id="{D928507B-9ED6-B7CB-8E33-40AD911186DA}"/>
+              </a:ext>
+            </a:extLst>
+          </p:cNvPr>
+          <p:cNvCxnSpPr/>
+          <p:nvPr/>
+        </p:nvCxnSpPr>
+        <p:spPr>
+          <a:xfrm flipH="1">
+            <a:off x="1288590" y="3491919"/>
+            <a:ext cx="3375682" cy="0"/>
+          </a:xfrm>
+          <a:prstGeom prst="straightConnector1">
+            <a:avLst/>
+          </a:prstGeom>
+          <a:ln>
+            <a:solidFill>
+              <a:schemeClr val="tx1"/>
+            </a:solidFill>
+            <a:tailEnd type="triangle"/>
+          </a:ln>
+        </p:spPr>
+        <p:style>
+          <a:lnRef idx="1">
+            <a:schemeClr val="accent1"/>
+          </a:lnRef>
+          <a:fillRef idx="0">
+            <a:schemeClr val="accent1"/>
+          </a:fillRef>
+          <a:effectRef idx="0">
+            <a:schemeClr val="accent1"/>
+          </a:effectRef>
+          <a:fontRef idx="minor">
+            <a:schemeClr val="tx1"/>
+          </a:fontRef>
+        </p:style>
+      </p:cxnSp>
+      <p:cxnSp>
+        <p:nvCxnSpPr>
+          <p:cNvPr id="40" name="Connecteur droit avec flèche 39">
+            <a:extLst>
+              <a:ext uri="{FF2B5EF4-FFF2-40B4-BE49-F238E27FC236}">
+                <a16:creationId xmlns:a16="http://schemas.microsoft.com/office/drawing/2014/main" id="{42A31D60-73CE-3D31-94F2-091F2ACF425E}"/>
+              </a:ext>
+            </a:extLst>
+          </p:cNvPr>
+          <p:cNvCxnSpPr/>
+          <p:nvPr/>
+        </p:nvCxnSpPr>
+        <p:spPr>
+          <a:xfrm flipH="1">
+            <a:off x="7527459" y="3271706"/>
+            <a:ext cx="3375682" cy="0"/>
+          </a:xfrm>
+          <a:prstGeom prst="straightConnector1">
+            <a:avLst/>
+          </a:prstGeom>
+          <a:ln>
+            <a:solidFill>
+              <a:schemeClr val="tx1"/>
+            </a:solidFill>
+            <a:tailEnd type="triangle"/>
+          </a:ln>
+        </p:spPr>
+        <p:style>
+          <a:lnRef idx="1">
+            <a:schemeClr val="accent1"/>
+          </a:lnRef>
+          <a:fillRef idx="0">
+            <a:schemeClr val="accent1"/>
+          </a:fillRef>
+          <a:effectRef idx="0">
+            <a:schemeClr val="accent1"/>
+          </a:effectRef>
+          <a:fontRef idx="minor">
+            <a:schemeClr val="tx1"/>
+          </a:fontRef>
+        </p:style>
+      </p:cxnSp>
+      <p:sp>
+        <p:nvSpPr>
+          <p:cNvPr id="44" name="ZoneTexte 43">
+            <a:extLst>
+              <a:ext uri="{FF2B5EF4-FFF2-40B4-BE49-F238E27FC236}">
+                <a16:creationId xmlns:a16="http://schemas.microsoft.com/office/drawing/2014/main" id="{6B52F600-C4D9-FC26-95DC-910227865EC5}"/>
+              </a:ext>
+            </a:extLst>
+          </p:cNvPr>
+          <p:cNvSpPr txBox="1"/>
+          <p:nvPr/>
+        </p:nvSpPr>
+        <p:spPr>
+          <a:xfrm>
+            <a:off x="2392648" y="1926941"/>
+            <a:ext cx="1011439" cy="307777"/>
+          </a:xfrm>
+          <a:prstGeom prst="rect">
+            <a:avLst/>
+          </a:prstGeom>
+          <a:noFill/>
+        </p:spPr>
+        <p:txBody>
+          <a:bodyPr wrap="square" rtlCol="0">
+            <a:spAutoFit/>
+          </a:bodyPr>
+          <a:lstStyle/>
+          <a:p>
+            <a:r>
+              <a:rPr lang="fr-FR" sz="1400" dirty="0"/>
+              <a:t>Ajoute</a:t>
+            </a:r>
+          </a:p>
+        </p:txBody>
+      </p:sp>
+      <p:sp>
+        <p:nvSpPr>
+          <p:cNvPr id="45" name="ZoneTexte 44">
+            <a:extLst>
+              <a:ext uri="{FF2B5EF4-FFF2-40B4-BE49-F238E27FC236}">
+                <a16:creationId xmlns:a16="http://schemas.microsoft.com/office/drawing/2014/main" id="{BDDEE66C-B8E1-B9A2-816E-EC7C5CADF9D1}"/>
+              </a:ext>
+            </a:extLst>
+          </p:cNvPr>
+          <p:cNvSpPr txBox="1"/>
+          <p:nvPr/>
+        </p:nvSpPr>
+        <p:spPr>
+          <a:xfrm>
+            <a:off x="9147030" y="1926941"/>
+            <a:ext cx="1011439" cy="307777"/>
+          </a:xfrm>
+          <a:prstGeom prst="rect">
+            <a:avLst/>
+          </a:prstGeom>
+          <a:noFill/>
+        </p:spPr>
+        <p:txBody>
+          <a:bodyPr wrap="square" rtlCol="0">
+            <a:spAutoFit/>
+          </a:bodyPr>
+          <a:lstStyle/>
+          <a:p>
+            <a:r>
+              <a:rPr lang="fr-FR" sz="1400" dirty="0"/>
+              <a:t>Ajoute</a:t>
+            </a:r>
+          </a:p>
+        </p:txBody>
+      </p:sp>
+      <p:sp>
+        <p:nvSpPr>
+          <p:cNvPr id="46" name="ZoneTexte 45">
+            <a:extLst>
+              <a:ext uri="{FF2B5EF4-FFF2-40B4-BE49-F238E27FC236}">
+                <a16:creationId xmlns:a16="http://schemas.microsoft.com/office/drawing/2014/main" id="{2557AE78-7C9A-5EE4-2CAE-77CB125B23E1}"/>
+              </a:ext>
+            </a:extLst>
+          </p:cNvPr>
+          <p:cNvSpPr txBox="1"/>
+          <p:nvPr/>
+        </p:nvSpPr>
+        <p:spPr>
+          <a:xfrm>
+            <a:off x="2348316" y="4371109"/>
+            <a:ext cx="1011439" cy="307777"/>
+          </a:xfrm>
+          <a:prstGeom prst="rect">
+            <a:avLst/>
+          </a:prstGeom>
+          <a:noFill/>
+        </p:spPr>
+        <p:txBody>
+          <a:bodyPr wrap="square" rtlCol="0">
+            <a:spAutoFit/>
+          </a:bodyPr>
+          <a:lstStyle/>
+          <a:p>
+            <a:r>
+              <a:rPr lang="fr-FR" sz="1400" dirty="0"/>
+              <a:t>Supprime</a:t>
+            </a:r>
+          </a:p>
+        </p:txBody>
+      </p:sp>
+      <p:sp>
+        <p:nvSpPr>
+          <p:cNvPr id="47" name="ZoneTexte 46">
+            <a:extLst>
+              <a:ext uri="{FF2B5EF4-FFF2-40B4-BE49-F238E27FC236}">
+                <a16:creationId xmlns:a16="http://schemas.microsoft.com/office/drawing/2014/main" id="{55F411D7-0E52-D994-1FB0-23D7864CAAD5}"/>
+              </a:ext>
+            </a:extLst>
+          </p:cNvPr>
+          <p:cNvSpPr txBox="1"/>
+          <p:nvPr/>
+        </p:nvSpPr>
+        <p:spPr>
+          <a:xfrm>
+            <a:off x="9142581" y="4371109"/>
+            <a:ext cx="1011439" cy="307777"/>
+          </a:xfrm>
+          <a:prstGeom prst="rect">
+            <a:avLst/>
+          </a:prstGeom>
+          <a:noFill/>
+        </p:spPr>
+        <p:txBody>
+          <a:bodyPr wrap="square" rtlCol="0">
+            <a:spAutoFit/>
+          </a:bodyPr>
+          <a:lstStyle/>
+          <a:p>
+            <a:r>
+              <a:rPr lang="fr-FR" sz="1400" dirty="0"/>
+              <a:t>Supprime</a:t>
+            </a:r>
+          </a:p>
+        </p:txBody>
+      </p:sp>
+      <p:sp>
+        <p:nvSpPr>
+          <p:cNvPr id="48" name="ZoneTexte 47">
+            <a:extLst>
+              <a:ext uri="{FF2B5EF4-FFF2-40B4-BE49-F238E27FC236}">
+                <a16:creationId xmlns:a16="http://schemas.microsoft.com/office/drawing/2014/main" id="{9A74EAEB-26DD-5728-D15E-70416FAE64F3}"/>
+              </a:ext>
+            </a:extLst>
+          </p:cNvPr>
+          <p:cNvSpPr txBox="1"/>
+          <p:nvPr/>
+        </p:nvSpPr>
+        <p:spPr>
+          <a:xfrm>
+            <a:off x="4947985" y="2333002"/>
+            <a:ext cx="1011439" cy="307777"/>
+          </a:xfrm>
+          <a:prstGeom prst="rect">
+            <a:avLst/>
+          </a:prstGeom>
+          <a:noFill/>
+        </p:spPr>
+        <p:txBody>
+          <a:bodyPr wrap="square" rtlCol="0">
+            <a:spAutoFit/>
+          </a:bodyPr>
+          <a:lstStyle/>
+          <a:p>
+            <a:r>
+              <a:rPr lang="fr-FR" sz="1400" dirty="0"/>
+              <a:t>Met à jour</a:t>
+            </a:r>
+          </a:p>
+        </p:txBody>
+      </p:sp>
+      <p:sp>
+        <p:nvSpPr>
+          <p:cNvPr id="49" name="ZoneTexte 48">
+            <a:extLst>
+              <a:ext uri="{FF2B5EF4-FFF2-40B4-BE49-F238E27FC236}">
+                <a16:creationId xmlns:a16="http://schemas.microsoft.com/office/drawing/2014/main" id="{C3116DF5-EC36-D3CD-C0DF-BA6F9D9E1E2F}"/>
+              </a:ext>
+            </a:extLst>
+          </p:cNvPr>
+          <p:cNvSpPr txBox="1"/>
+          <p:nvPr/>
+        </p:nvSpPr>
+        <p:spPr>
+          <a:xfrm>
+            <a:off x="6306138" y="4125545"/>
+            <a:ext cx="1011439" cy="307777"/>
+          </a:xfrm>
+          <a:prstGeom prst="rect">
+            <a:avLst/>
+          </a:prstGeom>
+          <a:noFill/>
+        </p:spPr>
+        <p:txBody>
+          <a:bodyPr wrap="square" rtlCol="0">
+            <a:spAutoFit/>
+          </a:bodyPr>
+          <a:lstStyle/>
+          <a:p>
+            <a:r>
+              <a:rPr lang="fr-FR" sz="1400" dirty="0"/>
+              <a:t>Met à jour</a:t>
+            </a:r>
+          </a:p>
+        </p:txBody>
+      </p:sp>
+      <p:sp>
+        <p:nvSpPr>
+          <p:cNvPr id="50" name="ZoneTexte 49">
+            <a:extLst>
+              <a:ext uri="{FF2B5EF4-FFF2-40B4-BE49-F238E27FC236}">
+                <a16:creationId xmlns:a16="http://schemas.microsoft.com/office/drawing/2014/main" id="{688ED31C-4675-13A3-E895-0BD66D51B142}"/>
+              </a:ext>
+            </a:extLst>
+          </p:cNvPr>
+          <p:cNvSpPr txBox="1"/>
+          <p:nvPr/>
+        </p:nvSpPr>
+        <p:spPr>
+          <a:xfrm>
+            <a:off x="2577198" y="2924870"/>
+            <a:ext cx="1011439" cy="307777"/>
+          </a:xfrm>
+          <a:prstGeom prst="rect">
+            <a:avLst/>
+          </a:prstGeom>
+          <a:noFill/>
+        </p:spPr>
+        <p:txBody>
+          <a:bodyPr wrap="square" rtlCol="0">
+            <a:spAutoFit/>
+          </a:bodyPr>
+          <a:lstStyle/>
+          <a:p>
+            <a:r>
+              <a:rPr lang="fr-FR" sz="1400" dirty="0"/>
+              <a:t>Consulte</a:t>
+            </a:r>
+          </a:p>
+        </p:txBody>
+      </p:sp>
+      <p:sp>
+        <p:nvSpPr>
+          <p:cNvPr id="51" name="ZoneTexte 50">
+            <a:extLst>
+              <a:ext uri="{FF2B5EF4-FFF2-40B4-BE49-F238E27FC236}">
+                <a16:creationId xmlns:a16="http://schemas.microsoft.com/office/drawing/2014/main" id="{B59DAED0-46AA-7965-FBFA-896C6D354BE4}"/>
+              </a:ext>
+            </a:extLst>
+          </p:cNvPr>
+          <p:cNvSpPr txBox="1"/>
+          <p:nvPr/>
+        </p:nvSpPr>
+        <p:spPr>
+          <a:xfrm>
+            <a:off x="8591668" y="2918658"/>
+            <a:ext cx="1011439" cy="307777"/>
+          </a:xfrm>
+          <a:prstGeom prst="rect">
+            <a:avLst/>
+          </a:prstGeom>
+          <a:noFill/>
+        </p:spPr>
+        <p:txBody>
+          <a:bodyPr wrap="square" rtlCol="0">
+            <a:spAutoFit/>
+          </a:bodyPr>
+          <a:lstStyle/>
+          <a:p>
+            <a:r>
+              <a:rPr lang="fr-FR" sz="1400" dirty="0"/>
+              <a:t>Consulte</a:t>
+            </a:r>
+          </a:p>
+        </p:txBody>
+      </p:sp>
+      <p:sp>
+        <p:nvSpPr>
+          <p:cNvPr id="52" name="ZoneTexte 51">
+            <a:extLst>
+              <a:ext uri="{FF2B5EF4-FFF2-40B4-BE49-F238E27FC236}">
+                <a16:creationId xmlns:a16="http://schemas.microsoft.com/office/drawing/2014/main" id="{D43F4038-B4F0-3F81-6F15-7D77E0973E75}"/>
+              </a:ext>
+            </a:extLst>
+          </p:cNvPr>
+          <p:cNvSpPr txBox="1"/>
+          <p:nvPr/>
+        </p:nvSpPr>
+        <p:spPr>
+          <a:xfrm>
+            <a:off x="2577197" y="3543129"/>
+            <a:ext cx="1214627" cy="307777"/>
+          </a:xfrm>
+          <a:prstGeom prst="rect">
+            <a:avLst/>
+          </a:prstGeom>
+          <a:noFill/>
+        </p:spPr>
+        <p:txBody>
+          <a:bodyPr wrap="square" rtlCol="0">
+            <a:spAutoFit/>
+          </a:bodyPr>
+          <a:lstStyle/>
+          <a:p>
+            <a:r>
+              <a:rPr lang="fr-FR" sz="1400" dirty="0"/>
+              <a:t>Notification</a:t>
+            </a:r>
+          </a:p>
+        </p:txBody>
+      </p:sp>
+      <p:sp>
+        <p:nvSpPr>
+          <p:cNvPr id="53" name="ZoneTexte 52">
+            <a:extLst>
+              <a:ext uri="{FF2B5EF4-FFF2-40B4-BE49-F238E27FC236}">
+                <a16:creationId xmlns:a16="http://schemas.microsoft.com/office/drawing/2014/main" id="{812344F0-427A-F3D3-777D-C837BF07F44C}"/>
+              </a:ext>
+            </a:extLst>
+          </p:cNvPr>
+          <p:cNvSpPr txBox="1"/>
+          <p:nvPr/>
+        </p:nvSpPr>
+        <p:spPr>
+          <a:xfrm>
+            <a:off x="8433673" y="3543128"/>
+            <a:ext cx="1214627" cy="307777"/>
+          </a:xfrm>
+          <a:prstGeom prst="rect">
+            <a:avLst/>
+          </a:prstGeom>
+          <a:noFill/>
+        </p:spPr>
+        <p:txBody>
+          <a:bodyPr wrap="square" rtlCol="0">
+            <a:spAutoFit/>
+          </a:bodyPr>
+          <a:lstStyle/>
+          <a:p>
+            <a:r>
+              <a:rPr lang="fr-FR" sz="1400" dirty="0"/>
+              <a:t>Notification</a:t>
+            </a:r>
+          </a:p>
+        </p:txBody>
+      </p:sp>
+      <p:sp>
+        <p:nvSpPr>
+          <p:cNvPr id="54" name="ZoneTexte 53">
+            <a:extLst>
+              <a:ext uri="{FF2B5EF4-FFF2-40B4-BE49-F238E27FC236}">
+                <a16:creationId xmlns:a16="http://schemas.microsoft.com/office/drawing/2014/main" id="{FCBEF7EC-AF9D-44A4-A952-45D99FE728E5}"/>
+              </a:ext>
+            </a:extLst>
+          </p:cNvPr>
+          <p:cNvSpPr txBox="1"/>
+          <p:nvPr/>
+        </p:nvSpPr>
+        <p:spPr>
+          <a:xfrm>
+            <a:off x="6334544" y="2012088"/>
+            <a:ext cx="1567997" cy="307777"/>
+          </a:xfrm>
+          <a:prstGeom prst="rect">
+            <a:avLst/>
+          </a:prstGeom>
+          <a:noFill/>
+        </p:spPr>
+        <p:txBody>
+          <a:bodyPr wrap="square" rtlCol="0">
+            <a:spAutoFit/>
+          </a:bodyPr>
+          <a:lstStyle/>
+          <a:p>
+            <a:r>
+              <a:rPr lang="fr-FR" sz="1400" dirty="0">
+                <a:solidFill>
+                  <a:srgbClr val="00B050"/>
+                </a:solidFill>
+              </a:rPr>
+              <a:t>Associe un élève ?</a:t>
+            </a:r>
+          </a:p>
+        </p:txBody>
+      </p:sp>
+      <p:sp>
+        <p:nvSpPr>
+          <p:cNvPr id="55" name="ZoneTexte 54">
+            <a:extLst>
+              <a:ext uri="{FF2B5EF4-FFF2-40B4-BE49-F238E27FC236}">
+                <a16:creationId xmlns:a16="http://schemas.microsoft.com/office/drawing/2014/main" id="{66298A5E-0ADE-8D47-9EF6-405F2C78B0F2}"/>
+              </a:ext>
+            </a:extLst>
+          </p:cNvPr>
+          <p:cNvSpPr txBox="1"/>
+          <p:nvPr/>
+        </p:nvSpPr>
+        <p:spPr>
+          <a:xfrm>
+            <a:off x="3951823" y="2025225"/>
+            <a:ext cx="2006895" cy="307777"/>
+          </a:xfrm>
+          <a:prstGeom prst="rect">
+            <a:avLst/>
+          </a:prstGeom>
+          <a:noFill/>
+        </p:spPr>
+        <p:txBody>
+          <a:bodyPr wrap="square" rtlCol="0">
+            <a:spAutoFit/>
+          </a:bodyPr>
+          <a:lstStyle/>
+          <a:p>
+            <a:r>
+              <a:rPr lang="fr-FR" sz="1400" dirty="0">
+                <a:solidFill>
+                  <a:srgbClr val="00B050"/>
+                </a:solidFill>
+              </a:rPr>
+              <a:t>Associe un pédagogue ?</a:t>
+            </a:r>
+          </a:p>
+        </p:txBody>
+      </p:sp>
     </p:spTree>
     <p:extLst>
       <p:ext uri="{BB962C8B-B14F-4D97-AF65-F5344CB8AC3E}">
@@ -8723,6 +11165,1326 @@
                 </a:solidFill>
               </a:rPr>
               <a:t>Liste des tâches</a:t>
+            </a:r>
+          </a:p>
+        </p:txBody>
+      </p:sp>
+      <p:pic>
+        <p:nvPicPr>
+          <p:cNvPr id="2" name="Image 1">
+            <a:extLst>
+              <a:ext uri="{FF2B5EF4-FFF2-40B4-BE49-F238E27FC236}">
+                <a16:creationId xmlns:a16="http://schemas.microsoft.com/office/drawing/2014/main" id="{D10CD2C9-C076-94BC-B142-73334F1E4909}"/>
+              </a:ext>
+            </a:extLst>
+          </p:cNvPr>
+          <p:cNvPicPr>
+            <a:picLocks noChangeAspect="1"/>
+          </p:cNvPicPr>
+          <p:nvPr/>
+        </p:nvPicPr>
+        <p:blipFill>
+          <a:blip r:embed="rId2"/>
+          <a:stretch>
+            <a:fillRect/>
+          </a:stretch>
+        </p:blipFill>
+        <p:spPr>
+          <a:xfrm>
+            <a:off x="10982150" y="2486891"/>
+            <a:ext cx="847898" cy="1884218"/>
+          </a:xfrm>
+          <a:prstGeom prst="rect">
+            <a:avLst/>
+          </a:prstGeom>
+        </p:spPr>
+      </p:pic>
+      <p:sp>
+        <p:nvSpPr>
+          <p:cNvPr id="3" name="ZoneTexte 2">
+            <a:extLst>
+              <a:ext uri="{FF2B5EF4-FFF2-40B4-BE49-F238E27FC236}">
+                <a16:creationId xmlns:a16="http://schemas.microsoft.com/office/drawing/2014/main" id="{1CD3E2E4-B436-286F-47C8-D8B598DDF1D8}"/>
+              </a:ext>
+            </a:extLst>
+          </p:cNvPr>
+          <p:cNvSpPr txBox="1"/>
+          <p:nvPr/>
+        </p:nvSpPr>
+        <p:spPr>
+          <a:xfrm>
+            <a:off x="10814026" y="2012088"/>
+            <a:ext cx="1333851" cy="369332"/>
+          </a:xfrm>
+          <a:prstGeom prst="rect">
+            <a:avLst/>
+          </a:prstGeom>
+          <a:noFill/>
+        </p:spPr>
+        <p:txBody>
+          <a:bodyPr wrap="square" rtlCol="0">
+            <a:spAutoFit/>
+          </a:bodyPr>
+          <a:lstStyle/>
+          <a:p>
+            <a:pPr algn="ctr"/>
+            <a:r>
+              <a:rPr lang="fr-FR" dirty="0">
+                <a:solidFill>
+                  <a:srgbClr val="D83950"/>
+                </a:solidFill>
+              </a:rPr>
+              <a:t>Pédagogue</a:t>
+            </a:r>
+          </a:p>
+        </p:txBody>
+      </p:sp>
+      <p:pic>
+        <p:nvPicPr>
+          <p:cNvPr id="6" name="Image 5">
+            <a:extLst>
+              <a:ext uri="{FF2B5EF4-FFF2-40B4-BE49-F238E27FC236}">
+                <a16:creationId xmlns:a16="http://schemas.microsoft.com/office/drawing/2014/main" id="{CDC2B421-1351-0634-05F7-3DEB0D3CA05C}"/>
+              </a:ext>
+            </a:extLst>
+          </p:cNvPr>
+          <p:cNvPicPr>
+            <a:picLocks noChangeAspect="1"/>
+          </p:cNvPicPr>
+          <p:nvPr/>
+        </p:nvPicPr>
+        <p:blipFill>
+          <a:blip r:embed="rId2"/>
+          <a:stretch>
+            <a:fillRect/>
+          </a:stretch>
+        </p:blipFill>
+        <p:spPr>
+          <a:xfrm>
+            <a:off x="361952" y="2486891"/>
+            <a:ext cx="847898" cy="1884218"/>
+          </a:xfrm>
+          <a:prstGeom prst="rect">
+            <a:avLst/>
+          </a:prstGeom>
+        </p:spPr>
+      </p:pic>
+      <p:sp>
+        <p:nvSpPr>
+          <p:cNvPr id="7" name="ZoneTexte 6">
+            <a:extLst>
+              <a:ext uri="{FF2B5EF4-FFF2-40B4-BE49-F238E27FC236}">
+                <a16:creationId xmlns:a16="http://schemas.microsoft.com/office/drawing/2014/main" id="{A83F2965-DBF0-F8FC-701D-FCB9AE1C2391}"/>
+              </a:ext>
+            </a:extLst>
+          </p:cNvPr>
+          <p:cNvSpPr txBox="1"/>
+          <p:nvPr/>
+        </p:nvSpPr>
+        <p:spPr>
+          <a:xfrm>
+            <a:off x="283212" y="2012088"/>
+            <a:ext cx="1005378" cy="369332"/>
+          </a:xfrm>
+          <a:prstGeom prst="rect">
+            <a:avLst/>
+          </a:prstGeom>
+          <a:noFill/>
+        </p:spPr>
+        <p:txBody>
+          <a:bodyPr wrap="square" rtlCol="0">
+            <a:spAutoFit/>
+          </a:bodyPr>
+          <a:lstStyle/>
+          <a:p>
+            <a:pPr algn="ctr"/>
+            <a:r>
+              <a:rPr lang="fr-FR" dirty="0">
+                <a:solidFill>
+                  <a:srgbClr val="D83950"/>
+                </a:solidFill>
+              </a:rPr>
+              <a:t>Élève</a:t>
+            </a:r>
+          </a:p>
+        </p:txBody>
+      </p:sp>
+      <p:sp>
+        <p:nvSpPr>
+          <p:cNvPr id="8" name="Rectangle 7">
+            <a:extLst>
+              <a:ext uri="{FF2B5EF4-FFF2-40B4-BE49-F238E27FC236}">
+                <a16:creationId xmlns:a16="http://schemas.microsoft.com/office/drawing/2014/main" id="{C34FA120-4D34-02BD-8A94-687E2023AE83}"/>
+              </a:ext>
+            </a:extLst>
+          </p:cNvPr>
+          <p:cNvSpPr/>
+          <p:nvPr/>
+        </p:nvSpPr>
+        <p:spPr>
+          <a:xfrm>
+            <a:off x="4762148" y="1570244"/>
+            <a:ext cx="2667699" cy="553673"/>
+          </a:xfrm>
+          <a:prstGeom prst="rect">
+            <a:avLst/>
+          </a:prstGeom>
+          <a:solidFill>
+            <a:srgbClr val="D83950"/>
+          </a:solidFill>
+          <a:ln>
+            <a:solidFill>
+              <a:srgbClr val="D83950"/>
+            </a:solidFill>
+          </a:ln>
+        </p:spPr>
+        <p:style>
+          <a:lnRef idx="2">
+            <a:schemeClr val="accent1">
+              <a:shade val="50000"/>
+            </a:schemeClr>
+          </a:lnRef>
+          <a:fillRef idx="1">
+            <a:schemeClr val="accent1"/>
+          </a:fillRef>
+          <a:effectRef idx="0">
+            <a:schemeClr val="accent1"/>
+          </a:effectRef>
+          <a:fontRef idx="minor">
+            <a:schemeClr val="lt1"/>
+          </a:fontRef>
+        </p:style>
+        <p:txBody>
+          <a:bodyPr rtlCol="0" anchor="ctr"/>
+          <a:lstStyle/>
+          <a:p>
+            <a:pPr algn="ctr"/>
+            <a:r>
+              <a:rPr lang="fr-FR" sz="1400" dirty="0"/>
+              <a:t>Tâche</a:t>
+            </a:r>
+          </a:p>
+        </p:txBody>
+      </p:sp>
+      <p:sp>
+        <p:nvSpPr>
+          <p:cNvPr id="9" name="Rectangle 8">
+            <a:extLst>
+              <a:ext uri="{FF2B5EF4-FFF2-40B4-BE49-F238E27FC236}">
+                <a16:creationId xmlns:a16="http://schemas.microsoft.com/office/drawing/2014/main" id="{60123629-A997-F550-4E49-8C341BAA7AAD}"/>
+              </a:ext>
+            </a:extLst>
+          </p:cNvPr>
+          <p:cNvSpPr/>
+          <p:nvPr/>
+        </p:nvSpPr>
+        <p:spPr>
+          <a:xfrm>
+            <a:off x="4762148" y="5362169"/>
+            <a:ext cx="2667699" cy="553673"/>
+          </a:xfrm>
+          <a:prstGeom prst="rect">
+            <a:avLst/>
+          </a:prstGeom>
+          <a:solidFill>
+            <a:srgbClr val="D83950"/>
+          </a:solidFill>
+          <a:ln>
+            <a:solidFill>
+              <a:srgbClr val="D83950"/>
+            </a:solidFill>
+          </a:ln>
+        </p:spPr>
+        <p:style>
+          <a:lnRef idx="2">
+            <a:schemeClr val="accent1">
+              <a:shade val="50000"/>
+            </a:schemeClr>
+          </a:lnRef>
+          <a:fillRef idx="1">
+            <a:schemeClr val="accent1"/>
+          </a:fillRef>
+          <a:effectRef idx="0">
+            <a:schemeClr val="accent1"/>
+          </a:effectRef>
+          <a:fontRef idx="minor">
+            <a:schemeClr val="lt1"/>
+          </a:fontRef>
+        </p:style>
+        <p:txBody>
+          <a:bodyPr rtlCol="0" anchor="ctr"/>
+          <a:lstStyle/>
+          <a:p>
+            <a:pPr algn="ctr"/>
+            <a:r>
+              <a:rPr lang="fr-FR" sz="1400" dirty="0"/>
+              <a:t>Tâche</a:t>
+            </a:r>
+          </a:p>
+        </p:txBody>
+      </p:sp>
+      <p:sp>
+        <p:nvSpPr>
+          <p:cNvPr id="10" name="Rectangle 9">
+            <a:extLst>
+              <a:ext uri="{FF2B5EF4-FFF2-40B4-BE49-F238E27FC236}">
+                <a16:creationId xmlns:a16="http://schemas.microsoft.com/office/drawing/2014/main" id="{43475E24-F114-2FDC-49E3-91113EFF5089}"/>
+              </a:ext>
+            </a:extLst>
+          </p:cNvPr>
+          <p:cNvSpPr/>
+          <p:nvPr/>
+        </p:nvSpPr>
+        <p:spPr>
+          <a:xfrm>
+            <a:off x="3450263" y="2747328"/>
+            <a:ext cx="2667699" cy="553673"/>
+          </a:xfrm>
+          <a:prstGeom prst="rect">
+            <a:avLst/>
+          </a:prstGeom>
+          <a:solidFill>
+            <a:srgbClr val="D83950"/>
+          </a:solidFill>
+          <a:ln>
+            <a:solidFill>
+              <a:srgbClr val="D83950"/>
+            </a:solidFill>
+          </a:ln>
+        </p:spPr>
+        <p:style>
+          <a:lnRef idx="2">
+            <a:schemeClr val="accent1">
+              <a:shade val="50000"/>
+            </a:schemeClr>
+          </a:lnRef>
+          <a:fillRef idx="1">
+            <a:schemeClr val="accent1"/>
+          </a:fillRef>
+          <a:effectRef idx="0">
+            <a:schemeClr val="accent1"/>
+          </a:effectRef>
+          <a:fontRef idx="minor">
+            <a:schemeClr val="lt1"/>
+          </a:fontRef>
+        </p:style>
+        <p:txBody>
+          <a:bodyPr rtlCol="0" anchor="ctr"/>
+          <a:lstStyle/>
+          <a:p>
+            <a:pPr algn="ctr"/>
+            <a:r>
+              <a:rPr lang="fr-FR" sz="1400" dirty="0"/>
+              <a:t>Liste des tâches élève</a:t>
+            </a:r>
+          </a:p>
+        </p:txBody>
+      </p:sp>
+      <p:sp>
+        <p:nvSpPr>
+          <p:cNvPr id="11" name="Rectangle 10">
+            <a:extLst>
+              <a:ext uri="{FF2B5EF4-FFF2-40B4-BE49-F238E27FC236}">
+                <a16:creationId xmlns:a16="http://schemas.microsoft.com/office/drawing/2014/main" id="{E40F720A-3C0B-AF13-8BA8-2A879825D3EE}"/>
+              </a:ext>
+            </a:extLst>
+          </p:cNvPr>
+          <p:cNvSpPr/>
+          <p:nvPr/>
+        </p:nvSpPr>
+        <p:spPr>
+          <a:xfrm>
+            <a:off x="6095997" y="3897797"/>
+            <a:ext cx="2667699" cy="553673"/>
+          </a:xfrm>
+          <a:prstGeom prst="rect">
+            <a:avLst/>
+          </a:prstGeom>
+          <a:solidFill>
+            <a:srgbClr val="D83950"/>
+          </a:solidFill>
+          <a:ln>
+            <a:solidFill>
+              <a:srgbClr val="D83950"/>
+            </a:solidFill>
+          </a:ln>
+        </p:spPr>
+        <p:style>
+          <a:lnRef idx="2">
+            <a:schemeClr val="accent1">
+              <a:shade val="50000"/>
+            </a:schemeClr>
+          </a:lnRef>
+          <a:fillRef idx="1">
+            <a:schemeClr val="accent1"/>
+          </a:fillRef>
+          <a:effectRef idx="0">
+            <a:schemeClr val="accent1"/>
+          </a:effectRef>
+          <a:fontRef idx="minor">
+            <a:schemeClr val="lt1"/>
+          </a:fontRef>
+        </p:style>
+        <p:txBody>
+          <a:bodyPr rtlCol="0" anchor="ctr"/>
+          <a:lstStyle/>
+          <a:p>
+            <a:pPr algn="ctr"/>
+            <a:r>
+              <a:rPr lang="fr-FR" sz="1400" dirty="0"/>
+              <a:t>Liste des tâches pédagogue</a:t>
+            </a:r>
+          </a:p>
+        </p:txBody>
+      </p:sp>
+      <p:cxnSp>
+        <p:nvCxnSpPr>
+          <p:cNvPr id="13" name="Connecteur droit avec flèche 12">
+            <a:extLst>
+              <a:ext uri="{FF2B5EF4-FFF2-40B4-BE49-F238E27FC236}">
+                <a16:creationId xmlns:a16="http://schemas.microsoft.com/office/drawing/2014/main" id="{4E150907-A2CD-7866-68AE-9CCEB3D69889}"/>
+              </a:ext>
+            </a:extLst>
+          </p:cNvPr>
+          <p:cNvCxnSpPr>
+            <a:cxnSpLocks/>
+            <a:endCxn id="8" idx="1"/>
+          </p:cNvCxnSpPr>
+          <p:nvPr/>
+        </p:nvCxnSpPr>
+        <p:spPr>
+          <a:xfrm flipV="1">
+            <a:off x="1299224" y="1847081"/>
+            <a:ext cx="3462924" cy="1449792"/>
+          </a:xfrm>
+          <a:prstGeom prst="straightConnector1">
+            <a:avLst/>
+          </a:prstGeom>
+          <a:ln>
+            <a:solidFill>
+              <a:schemeClr val="tx1"/>
+            </a:solidFill>
+            <a:tailEnd type="triangle"/>
+          </a:ln>
+        </p:spPr>
+        <p:style>
+          <a:lnRef idx="1">
+            <a:schemeClr val="accent1"/>
+          </a:lnRef>
+          <a:fillRef idx="0">
+            <a:schemeClr val="accent1"/>
+          </a:fillRef>
+          <a:effectRef idx="0">
+            <a:schemeClr val="accent1"/>
+          </a:effectRef>
+          <a:fontRef idx="minor">
+            <a:schemeClr val="tx1"/>
+          </a:fontRef>
+        </p:style>
+      </p:cxnSp>
+      <p:cxnSp>
+        <p:nvCxnSpPr>
+          <p:cNvPr id="14" name="Connecteur droit avec flèche 13">
+            <a:extLst>
+              <a:ext uri="{FF2B5EF4-FFF2-40B4-BE49-F238E27FC236}">
+                <a16:creationId xmlns:a16="http://schemas.microsoft.com/office/drawing/2014/main" id="{F870394A-23BE-2965-E43E-B251F945E30A}"/>
+              </a:ext>
+            </a:extLst>
+          </p:cNvPr>
+          <p:cNvCxnSpPr>
+            <a:cxnSpLocks/>
+            <a:endCxn id="10" idx="1"/>
+          </p:cNvCxnSpPr>
+          <p:nvPr/>
+        </p:nvCxnSpPr>
+        <p:spPr>
+          <a:xfrm flipV="1">
+            <a:off x="1288228" y="3024165"/>
+            <a:ext cx="2162035" cy="272708"/>
+          </a:xfrm>
+          <a:prstGeom prst="straightConnector1">
+            <a:avLst/>
+          </a:prstGeom>
+          <a:ln>
+            <a:solidFill>
+              <a:schemeClr val="tx1"/>
+            </a:solidFill>
+            <a:tailEnd type="triangle"/>
+          </a:ln>
+        </p:spPr>
+        <p:style>
+          <a:lnRef idx="1">
+            <a:schemeClr val="accent1"/>
+          </a:lnRef>
+          <a:fillRef idx="0">
+            <a:schemeClr val="accent1"/>
+          </a:fillRef>
+          <a:effectRef idx="0">
+            <a:schemeClr val="accent1"/>
+          </a:effectRef>
+          <a:fontRef idx="minor">
+            <a:schemeClr val="tx1"/>
+          </a:fontRef>
+        </p:style>
+      </p:cxnSp>
+      <p:cxnSp>
+        <p:nvCxnSpPr>
+          <p:cNvPr id="17" name="Connecteur droit avec flèche 16">
+            <a:extLst>
+              <a:ext uri="{FF2B5EF4-FFF2-40B4-BE49-F238E27FC236}">
+                <a16:creationId xmlns:a16="http://schemas.microsoft.com/office/drawing/2014/main" id="{5DA82485-E25A-C3CB-6FFF-1A77A88E30D0}"/>
+              </a:ext>
+            </a:extLst>
+          </p:cNvPr>
+          <p:cNvCxnSpPr>
+            <a:stCxn id="8" idx="2"/>
+            <a:endCxn id="10" idx="0"/>
+          </p:cNvCxnSpPr>
+          <p:nvPr/>
+        </p:nvCxnSpPr>
+        <p:spPr>
+          <a:xfrm flipH="1">
+            <a:off x="4784113" y="2123917"/>
+            <a:ext cx="1311885" cy="623411"/>
+          </a:xfrm>
+          <a:prstGeom prst="straightConnector1">
+            <a:avLst/>
+          </a:prstGeom>
+          <a:ln>
+            <a:solidFill>
+              <a:schemeClr val="tx1"/>
+            </a:solidFill>
+            <a:tailEnd type="triangle"/>
+          </a:ln>
+        </p:spPr>
+        <p:style>
+          <a:lnRef idx="1">
+            <a:schemeClr val="accent1"/>
+          </a:lnRef>
+          <a:fillRef idx="0">
+            <a:schemeClr val="accent1"/>
+          </a:fillRef>
+          <a:effectRef idx="0">
+            <a:schemeClr val="accent1"/>
+          </a:effectRef>
+          <a:fontRef idx="minor">
+            <a:schemeClr val="tx1"/>
+          </a:fontRef>
+        </p:style>
+      </p:cxnSp>
+      <p:cxnSp>
+        <p:nvCxnSpPr>
+          <p:cNvPr id="19" name="Connecteur droit avec flèche 18">
+            <a:extLst>
+              <a:ext uri="{FF2B5EF4-FFF2-40B4-BE49-F238E27FC236}">
+                <a16:creationId xmlns:a16="http://schemas.microsoft.com/office/drawing/2014/main" id="{5449513A-430D-1230-C223-A71791B8AC04}"/>
+              </a:ext>
+            </a:extLst>
+          </p:cNvPr>
+          <p:cNvCxnSpPr>
+            <a:stCxn id="9" idx="0"/>
+            <a:endCxn id="11" idx="2"/>
+          </p:cNvCxnSpPr>
+          <p:nvPr/>
+        </p:nvCxnSpPr>
+        <p:spPr>
+          <a:xfrm flipV="1">
+            <a:off x="6095998" y="4451470"/>
+            <a:ext cx="1333849" cy="910699"/>
+          </a:xfrm>
+          <a:prstGeom prst="straightConnector1">
+            <a:avLst/>
+          </a:prstGeom>
+          <a:ln>
+            <a:solidFill>
+              <a:schemeClr val="tx1"/>
+            </a:solidFill>
+            <a:tailEnd type="triangle"/>
+          </a:ln>
+        </p:spPr>
+        <p:style>
+          <a:lnRef idx="1">
+            <a:schemeClr val="accent1"/>
+          </a:lnRef>
+          <a:fillRef idx="0">
+            <a:schemeClr val="accent1"/>
+          </a:fillRef>
+          <a:effectRef idx="0">
+            <a:schemeClr val="accent1"/>
+          </a:effectRef>
+          <a:fontRef idx="minor">
+            <a:schemeClr val="tx1"/>
+          </a:fontRef>
+        </p:style>
+      </p:cxnSp>
+      <p:cxnSp>
+        <p:nvCxnSpPr>
+          <p:cNvPr id="21" name="Connecteur droit avec flèche 20">
+            <a:extLst>
+              <a:ext uri="{FF2B5EF4-FFF2-40B4-BE49-F238E27FC236}">
+                <a16:creationId xmlns:a16="http://schemas.microsoft.com/office/drawing/2014/main" id="{773593A6-7836-C1D1-EC9F-2BFB219F2E32}"/>
+              </a:ext>
+            </a:extLst>
+          </p:cNvPr>
+          <p:cNvCxnSpPr>
+            <a:cxnSpLocks/>
+            <a:endCxn id="9" idx="3"/>
+          </p:cNvCxnSpPr>
+          <p:nvPr/>
+        </p:nvCxnSpPr>
+        <p:spPr>
+          <a:xfrm flipH="1">
+            <a:off x="7429847" y="3292119"/>
+            <a:ext cx="3473555" cy="2346887"/>
+          </a:xfrm>
+          <a:prstGeom prst="straightConnector1">
+            <a:avLst/>
+          </a:prstGeom>
+          <a:ln>
+            <a:solidFill>
+              <a:schemeClr val="tx1"/>
+            </a:solidFill>
+            <a:tailEnd type="triangle"/>
+          </a:ln>
+        </p:spPr>
+        <p:style>
+          <a:lnRef idx="1">
+            <a:schemeClr val="accent1"/>
+          </a:lnRef>
+          <a:fillRef idx="0">
+            <a:schemeClr val="accent1"/>
+          </a:fillRef>
+          <a:effectRef idx="0">
+            <a:schemeClr val="accent1"/>
+          </a:effectRef>
+          <a:fontRef idx="minor">
+            <a:schemeClr val="tx1"/>
+          </a:fontRef>
+        </p:style>
+      </p:cxnSp>
+      <p:cxnSp>
+        <p:nvCxnSpPr>
+          <p:cNvPr id="24" name="Connecteur droit avec flèche 23">
+            <a:extLst>
+              <a:ext uri="{FF2B5EF4-FFF2-40B4-BE49-F238E27FC236}">
+                <a16:creationId xmlns:a16="http://schemas.microsoft.com/office/drawing/2014/main" id="{4548D730-4EB5-785E-18FC-323208C180D7}"/>
+              </a:ext>
+            </a:extLst>
+          </p:cNvPr>
+          <p:cNvCxnSpPr>
+            <a:cxnSpLocks/>
+            <a:endCxn id="11" idx="3"/>
+          </p:cNvCxnSpPr>
+          <p:nvPr/>
+        </p:nvCxnSpPr>
+        <p:spPr>
+          <a:xfrm flipH="1">
+            <a:off x="8763696" y="3292645"/>
+            <a:ext cx="2139706" cy="881989"/>
+          </a:xfrm>
+          <a:prstGeom prst="straightConnector1">
+            <a:avLst/>
+          </a:prstGeom>
+          <a:ln>
+            <a:solidFill>
+              <a:schemeClr val="tx1"/>
+            </a:solidFill>
+            <a:tailEnd type="triangle"/>
+          </a:ln>
+        </p:spPr>
+        <p:style>
+          <a:lnRef idx="1">
+            <a:schemeClr val="accent1"/>
+          </a:lnRef>
+          <a:fillRef idx="0">
+            <a:schemeClr val="accent1"/>
+          </a:fillRef>
+          <a:effectRef idx="0">
+            <a:schemeClr val="accent1"/>
+          </a:effectRef>
+          <a:fontRef idx="minor">
+            <a:schemeClr val="tx1"/>
+          </a:fontRef>
+        </p:style>
+      </p:cxnSp>
+      <p:cxnSp>
+        <p:nvCxnSpPr>
+          <p:cNvPr id="26" name="Connecteur droit avec flèche 25">
+            <a:extLst>
+              <a:ext uri="{FF2B5EF4-FFF2-40B4-BE49-F238E27FC236}">
+                <a16:creationId xmlns:a16="http://schemas.microsoft.com/office/drawing/2014/main" id="{2F85C590-108E-C25C-9988-65DCFF8D6AB0}"/>
+              </a:ext>
+            </a:extLst>
+          </p:cNvPr>
+          <p:cNvCxnSpPr>
+            <a:cxnSpLocks/>
+            <a:endCxn id="10" idx="3"/>
+          </p:cNvCxnSpPr>
+          <p:nvPr/>
+        </p:nvCxnSpPr>
+        <p:spPr>
+          <a:xfrm flipH="1" flipV="1">
+            <a:off x="6117962" y="3024165"/>
+            <a:ext cx="4774814" cy="284666"/>
+          </a:xfrm>
+          <a:prstGeom prst="straightConnector1">
+            <a:avLst/>
+          </a:prstGeom>
+          <a:ln>
+            <a:solidFill>
+              <a:schemeClr val="tx1"/>
+            </a:solidFill>
+            <a:tailEnd type="triangle"/>
+          </a:ln>
+        </p:spPr>
+        <p:style>
+          <a:lnRef idx="1">
+            <a:schemeClr val="accent1"/>
+          </a:lnRef>
+          <a:fillRef idx="0">
+            <a:schemeClr val="accent1"/>
+          </a:fillRef>
+          <a:effectRef idx="0">
+            <a:schemeClr val="accent1"/>
+          </a:effectRef>
+          <a:fontRef idx="minor">
+            <a:schemeClr val="tx1"/>
+          </a:fontRef>
+        </p:style>
+      </p:cxnSp>
+      <p:cxnSp>
+        <p:nvCxnSpPr>
+          <p:cNvPr id="28" name="Connecteur droit avec flèche 27">
+            <a:extLst>
+              <a:ext uri="{FF2B5EF4-FFF2-40B4-BE49-F238E27FC236}">
+                <a16:creationId xmlns:a16="http://schemas.microsoft.com/office/drawing/2014/main" id="{15DCF027-F660-79B2-D8B7-717855728B13}"/>
+              </a:ext>
+            </a:extLst>
+          </p:cNvPr>
+          <p:cNvCxnSpPr>
+            <a:stCxn id="9" idx="0"/>
+            <a:endCxn id="10" idx="2"/>
+          </p:cNvCxnSpPr>
+          <p:nvPr/>
+        </p:nvCxnSpPr>
+        <p:spPr>
+          <a:xfrm flipH="1" flipV="1">
+            <a:off x="4784113" y="3301001"/>
+            <a:ext cx="1311885" cy="2061168"/>
+          </a:xfrm>
+          <a:prstGeom prst="straightConnector1">
+            <a:avLst/>
+          </a:prstGeom>
+          <a:ln>
+            <a:solidFill>
+              <a:schemeClr val="tx1"/>
+            </a:solidFill>
+            <a:tailEnd type="triangle"/>
+          </a:ln>
+        </p:spPr>
+        <p:style>
+          <a:lnRef idx="1">
+            <a:schemeClr val="accent1"/>
+          </a:lnRef>
+          <a:fillRef idx="0">
+            <a:schemeClr val="accent1"/>
+          </a:fillRef>
+          <a:effectRef idx="0">
+            <a:schemeClr val="accent1"/>
+          </a:effectRef>
+          <a:fontRef idx="minor">
+            <a:schemeClr val="tx1"/>
+          </a:fontRef>
+        </p:style>
+      </p:cxnSp>
+      <p:sp>
+        <p:nvSpPr>
+          <p:cNvPr id="29" name="ZoneTexte 28">
+            <a:extLst>
+              <a:ext uri="{FF2B5EF4-FFF2-40B4-BE49-F238E27FC236}">
+                <a16:creationId xmlns:a16="http://schemas.microsoft.com/office/drawing/2014/main" id="{DD271B4D-6000-09F1-3682-E3D2A3639DB2}"/>
+              </a:ext>
+            </a:extLst>
+          </p:cNvPr>
+          <p:cNvSpPr txBox="1"/>
+          <p:nvPr/>
+        </p:nvSpPr>
+        <p:spPr>
+          <a:xfrm>
+            <a:off x="2094448" y="2029486"/>
+            <a:ext cx="1248116" cy="307777"/>
+          </a:xfrm>
+          <a:prstGeom prst="rect">
+            <a:avLst/>
+          </a:prstGeom>
+          <a:noFill/>
+        </p:spPr>
+        <p:txBody>
+          <a:bodyPr wrap="square" rtlCol="0">
+            <a:spAutoFit/>
+          </a:bodyPr>
+          <a:lstStyle/>
+          <a:p>
+            <a:r>
+              <a:rPr lang="fr-FR" sz="1400" dirty="0"/>
+              <a:t>Ajoute / édite</a:t>
+            </a:r>
+          </a:p>
+        </p:txBody>
+      </p:sp>
+      <p:sp>
+        <p:nvSpPr>
+          <p:cNvPr id="30" name="ZoneTexte 29">
+            <a:extLst>
+              <a:ext uri="{FF2B5EF4-FFF2-40B4-BE49-F238E27FC236}">
+                <a16:creationId xmlns:a16="http://schemas.microsoft.com/office/drawing/2014/main" id="{E7BEA322-1926-7E89-FE86-81D59D7AA469}"/>
+              </a:ext>
+            </a:extLst>
+          </p:cNvPr>
+          <p:cNvSpPr txBox="1"/>
+          <p:nvPr/>
+        </p:nvSpPr>
+        <p:spPr>
+          <a:xfrm>
+            <a:off x="8859729" y="4262510"/>
+            <a:ext cx="2072081" cy="307777"/>
+          </a:xfrm>
+          <a:prstGeom prst="rect">
+            <a:avLst/>
+          </a:prstGeom>
+          <a:noFill/>
+        </p:spPr>
+        <p:txBody>
+          <a:bodyPr wrap="square" rtlCol="0">
+            <a:spAutoFit/>
+          </a:bodyPr>
+          <a:lstStyle/>
+          <a:p>
+            <a:r>
+              <a:rPr lang="fr-FR" sz="1400" dirty="0"/>
+              <a:t>Ajoute / supprime / édite</a:t>
+            </a:r>
+          </a:p>
+        </p:txBody>
+      </p:sp>
+      <p:sp>
+        <p:nvSpPr>
+          <p:cNvPr id="31" name="ZoneTexte 30">
+            <a:extLst>
+              <a:ext uri="{FF2B5EF4-FFF2-40B4-BE49-F238E27FC236}">
+                <a16:creationId xmlns:a16="http://schemas.microsoft.com/office/drawing/2014/main" id="{4AF289E6-1339-DEDB-3706-1374C36FB446}"/>
+              </a:ext>
+            </a:extLst>
+          </p:cNvPr>
+          <p:cNvSpPr txBox="1"/>
+          <p:nvPr/>
+        </p:nvSpPr>
+        <p:spPr>
+          <a:xfrm>
+            <a:off x="2450894" y="3077799"/>
+            <a:ext cx="1011439" cy="307777"/>
+          </a:xfrm>
+          <a:prstGeom prst="rect">
+            <a:avLst/>
+          </a:prstGeom>
+          <a:noFill/>
+        </p:spPr>
+        <p:txBody>
+          <a:bodyPr wrap="square" rtlCol="0">
+            <a:spAutoFit/>
+          </a:bodyPr>
+          <a:lstStyle/>
+          <a:p>
+            <a:r>
+              <a:rPr lang="fr-FR" sz="1400" dirty="0"/>
+              <a:t>Consulte</a:t>
+            </a:r>
+          </a:p>
+        </p:txBody>
+      </p:sp>
+      <p:sp>
+        <p:nvSpPr>
+          <p:cNvPr id="32" name="ZoneTexte 31">
+            <a:extLst>
+              <a:ext uri="{FF2B5EF4-FFF2-40B4-BE49-F238E27FC236}">
+                <a16:creationId xmlns:a16="http://schemas.microsoft.com/office/drawing/2014/main" id="{4E53EB4D-CF9F-41BB-28F9-3248785EA431}"/>
+              </a:ext>
+            </a:extLst>
+          </p:cNvPr>
+          <p:cNvSpPr txBox="1"/>
+          <p:nvPr/>
+        </p:nvSpPr>
+        <p:spPr>
+          <a:xfrm>
+            <a:off x="8225471" y="2595805"/>
+            <a:ext cx="1011439" cy="307777"/>
+          </a:xfrm>
+          <a:prstGeom prst="rect">
+            <a:avLst/>
+          </a:prstGeom>
+          <a:noFill/>
+        </p:spPr>
+        <p:txBody>
+          <a:bodyPr wrap="square" rtlCol="0">
+            <a:spAutoFit/>
+          </a:bodyPr>
+          <a:lstStyle/>
+          <a:p>
+            <a:r>
+              <a:rPr lang="fr-FR" sz="1400" dirty="0"/>
+              <a:t>Consulte</a:t>
+            </a:r>
+          </a:p>
+        </p:txBody>
+      </p:sp>
+      <p:sp>
+        <p:nvSpPr>
+          <p:cNvPr id="33" name="ZoneTexte 32">
+            <a:extLst>
+              <a:ext uri="{FF2B5EF4-FFF2-40B4-BE49-F238E27FC236}">
+                <a16:creationId xmlns:a16="http://schemas.microsoft.com/office/drawing/2014/main" id="{6E128BC6-CCAD-64DC-ED7B-02DE60C285BE}"/>
+              </a:ext>
+            </a:extLst>
+          </p:cNvPr>
+          <p:cNvSpPr txBox="1"/>
+          <p:nvPr/>
+        </p:nvSpPr>
+        <p:spPr>
+          <a:xfrm>
+            <a:off x="9098091" y="3242245"/>
+            <a:ext cx="1011439" cy="307777"/>
+          </a:xfrm>
+          <a:prstGeom prst="rect">
+            <a:avLst/>
+          </a:prstGeom>
+          <a:noFill/>
+        </p:spPr>
+        <p:txBody>
+          <a:bodyPr wrap="square" rtlCol="0">
+            <a:spAutoFit/>
+          </a:bodyPr>
+          <a:lstStyle/>
+          <a:p>
+            <a:r>
+              <a:rPr lang="fr-FR" sz="1400" dirty="0"/>
+              <a:t>Consulte</a:t>
+            </a:r>
+          </a:p>
+        </p:txBody>
+      </p:sp>
+      <p:sp>
+        <p:nvSpPr>
+          <p:cNvPr id="34" name="ZoneTexte 33">
+            <a:extLst>
+              <a:ext uri="{FF2B5EF4-FFF2-40B4-BE49-F238E27FC236}">
+                <a16:creationId xmlns:a16="http://schemas.microsoft.com/office/drawing/2014/main" id="{CFADCA6B-0149-34DB-BC70-649139DB5213}"/>
+              </a:ext>
+            </a:extLst>
+          </p:cNvPr>
+          <p:cNvSpPr txBox="1"/>
+          <p:nvPr/>
+        </p:nvSpPr>
+        <p:spPr>
+          <a:xfrm>
+            <a:off x="5525082" y="2307725"/>
+            <a:ext cx="1011439" cy="307777"/>
+          </a:xfrm>
+          <a:prstGeom prst="rect">
+            <a:avLst/>
+          </a:prstGeom>
+          <a:noFill/>
+        </p:spPr>
+        <p:txBody>
+          <a:bodyPr wrap="square" rtlCol="0">
+            <a:spAutoFit/>
+          </a:bodyPr>
+          <a:lstStyle/>
+          <a:p>
+            <a:r>
+              <a:rPr lang="fr-FR" sz="1400" dirty="0"/>
+              <a:t>Met à jour</a:t>
+            </a:r>
+          </a:p>
+        </p:txBody>
+      </p:sp>
+      <p:sp>
+        <p:nvSpPr>
+          <p:cNvPr id="35" name="ZoneTexte 34">
+            <a:extLst>
+              <a:ext uri="{FF2B5EF4-FFF2-40B4-BE49-F238E27FC236}">
+                <a16:creationId xmlns:a16="http://schemas.microsoft.com/office/drawing/2014/main" id="{B6BB245E-DAD0-D2B1-3C73-08540E9636E3}"/>
+              </a:ext>
+            </a:extLst>
+          </p:cNvPr>
+          <p:cNvSpPr txBox="1"/>
+          <p:nvPr/>
+        </p:nvSpPr>
+        <p:spPr>
+          <a:xfrm>
+            <a:off x="6821336" y="4808496"/>
+            <a:ext cx="1011439" cy="307777"/>
+          </a:xfrm>
+          <a:prstGeom prst="rect">
+            <a:avLst/>
+          </a:prstGeom>
+          <a:noFill/>
+        </p:spPr>
+        <p:txBody>
+          <a:bodyPr wrap="square" rtlCol="0">
+            <a:spAutoFit/>
+          </a:bodyPr>
+          <a:lstStyle/>
+          <a:p>
+            <a:r>
+              <a:rPr lang="fr-FR" sz="1400" dirty="0"/>
+              <a:t>Met à jour</a:t>
+            </a:r>
+          </a:p>
+        </p:txBody>
+      </p:sp>
+      <p:sp>
+        <p:nvSpPr>
+          <p:cNvPr id="36" name="ZoneTexte 35">
+            <a:extLst>
+              <a:ext uri="{FF2B5EF4-FFF2-40B4-BE49-F238E27FC236}">
+                <a16:creationId xmlns:a16="http://schemas.microsoft.com/office/drawing/2014/main" id="{9C161CC6-BE68-9F51-C9FC-1FEA88882B98}"/>
+              </a:ext>
+            </a:extLst>
+          </p:cNvPr>
+          <p:cNvSpPr txBox="1"/>
+          <p:nvPr/>
+        </p:nvSpPr>
+        <p:spPr>
+          <a:xfrm>
+            <a:off x="4339815" y="3682623"/>
+            <a:ext cx="1011439" cy="307777"/>
+          </a:xfrm>
+          <a:prstGeom prst="rect">
+            <a:avLst/>
+          </a:prstGeom>
+          <a:noFill/>
+        </p:spPr>
+        <p:txBody>
+          <a:bodyPr wrap="square" rtlCol="0">
+            <a:spAutoFit/>
+          </a:bodyPr>
+          <a:lstStyle/>
+          <a:p>
+            <a:r>
+              <a:rPr lang="fr-FR" sz="1400" dirty="0"/>
+              <a:t>Assigne</a:t>
+            </a:r>
+          </a:p>
+        </p:txBody>
+      </p:sp>
+      <p:sp>
+        <p:nvSpPr>
+          <p:cNvPr id="37" name="Rectangle 36">
+            <a:extLst>
+              <a:ext uri="{FF2B5EF4-FFF2-40B4-BE49-F238E27FC236}">
+                <a16:creationId xmlns:a16="http://schemas.microsoft.com/office/drawing/2014/main" id="{CA6D252E-0CBB-D008-0FF5-3543838AF211}"/>
+              </a:ext>
+            </a:extLst>
+          </p:cNvPr>
+          <p:cNvSpPr/>
+          <p:nvPr/>
+        </p:nvSpPr>
+        <p:spPr>
+          <a:xfrm>
+            <a:off x="5525085" y="996797"/>
+            <a:ext cx="1141825" cy="369116"/>
+          </a:xfrm>
+          <a:prstGeom prst="rect">
+            <a:avLst/>
+          </a:prstGeom>
+          <a:solidFill>
+            <a:srgbClr val="D83950"/>
+          </a:solidFill>
+          <a:ln>
+            <a:solidFill>
+              <a:srgbClr val="D83950"/>
+            </a:solidFill>
+          </a:ln>
+        </p:spPr>
+        <p:style>
+          <a:lnRef idx="2">
+            <a:schemeClr val="accent1">
+              <a:shade val="50000"/>
+            </a:schemeClr>
+          </a:lnRef>
+          <a:fillRef idx="1">
+            <a:schemeClr val="accent1"/>
+          </a:fillRef>
+          <a:effectRef idx="0">
+            <a:schemeClr val="accent1"/>
+          </a:effectRef>
+          <a:fontRef idx="minor">
+            <a:schemeClr val="lt1"/>
+          </a:fontRef>
+        </p:style>
+        <p:txBody>
+          <a:bodyPr rtlCol="0" anchor="ctr"/>
+          <a:lstStyle/>
+          <a:p>
+            <a:pPr algn="ctr"/>
+            <a:r>
+              <a:rPr lang="fr-FR" sz="1400" dirty="0"/>
+              <a:t>Supprime</a:t>
+            </a:r>
+          </a:p>
+        </p:txBody>
+      </p:sp>
+      <p:cxnSp>
+        <p:nvCxnSpPr>
+          <p:cNvPr id="39" name="Connecteur droit avec flèche 38">
+            <a:extLst>
+              <a:ext uri="{FF2B5EF4-FFF2-40B4-BE49-F238E27FC236}">
+                <a16:creationId xmlns:a16="http://schemas.microsoft.com/office/drawing/2014/main" id="{B8BA341C-ECF5-2CD2-11B2-111FE84BD385}"/>
+              </a:ext>
+            </a:extLst>
+          </p:cNvPr>
+          <p:cNvCxnSpPr>
+            <a:cxnSpLocks/>
+          </p:cNvCxnSpPr>
+          <p:nvPr/>
+        </p:nvCxnSpPr>
+        <p:spPr>
+          <a:xfrm>
+            <a:off x="1288228" y="1171453"/>
+            <a:ext cx="4236487" cy="9902"/>
+          </a:xfrm>
+          <a:prstGeom prst="straightConnector1">
+            <a:avLst/>
+          </a:prstGeom>
+          <a:ln>
+            <a:solidFill>
+              <a:schemeClr val="tx1"/>
+            </a:solidFill>
+            <a:tailEnd type="triangle"/>
+          </a:ln>
+        </p:spPr>
+        <p:style>
+          <a:lnRef idx="1">
+            <a:schemeClr val="accent1"/>
+          </a:lnRef>
+          <a:fillRef idx="0">
+            <a:schemeClr val="accent1"/>
+          </a:fillRef>
+          <a:effectRef idx="0">
+            <a:schemeClr val="accent1"/>
+          </a:effectRef>
+          <a:fontRef idx="minor">
+            <a:schemeClr val="tx1"/>
+          </a:fontRef>
+        </p:style>
+      </p:cxnSp>
+      <p:cxnSp>
+        <p:nvCxnSpPr>
+          <p:cNvPr id="46" name="Connecteur droit 45">
+            <a:extLst>
+              <a:ext uri="{FF2B5EF4-FFF2-40B4-BE49-F238E27FC236}">
+                <a16:creationId xmlns:a16="http://schemas.microsoft.com/office/drawing/2014/main" id="{E578BE0F-3228-3925-E738-988763273730}"/>
+              </a:ext>
+            </a:extLst>
+          </p:cNvPr>
+          <p:cNvCxnSpPr>
+            <a:cxnSpLocks/>
+          </p:cNvCxnSpPr>
+          <p:nvPr/>
+        </p:nvCxnSpPr>
+        <p:spPr>
+          <a:xfrm>
+            <a:off x="1288228" y="1171453"/>
+            <a:ext cx="362" cy="2125420"/>
+          </a:xfrm>
+          <a:prstGeom prst="line">
+            <a:avLst/>
+          </a:prstGeom>
+          <a:ln>
+            <a:solidFill>
+              <a:schemeClr val="tx1"/>
+            </a:solidFill>
+          </a:ln>
+        </p:spPr>
+        <p:style>
+          <a:lnRef idx="1">
+            <a:schemeClr val="accent1"/>
+          </a:lnRef>
+          <a:fillRef idx="0">
+            <a:schemeClr val="accent1"/>
+          </a:fillRef>
+          <a:effectRef idx="0">
+            <a:schemeClr val="accent1"/>
+          </a:effectRef>
+          <a:fontRef idx="minor">
+            <a:schemeClr val="tx1"/>
+          </a:fontRef>
+        </p:style>
+      </p:cxnSp>
+      <p:cxnSp>
+        <p:nvCxnSpPr>
+          <p:cNvPr id="48" name="Connecteur droit avec flèche 47">
+            <a:extLst>
+              <a:ext uri="{FF2B5EF4-FFF2-40B4-BE49-F238E27FC236}">
+                <a16:creationId xmlns:a16="http://schemas.microsoft.com/office/drawing/2014/main" id="{56E75DEC-FEE7-CCA5-1445-B8B879955E3F}"/>
+              </a:ext>
+            </a:extLst>
+          </p:cNvPr>
+          <p:cNvCxnSpPr>
+            <a:stCxn id="37" idx="2"/>
+            <a:endCxn id="8" idx="0"/>
+          </p:cNvCxnSpPr>
+          <p:nvPr/>
+        </p:nvCxnSpPr>
+        <p:spPr>
+          <a:xfrm>
+            <a:off x="6095998" y="1365913"/>
+            <a:ext cx="0" cy="204331"/>
+          </a:xfrm>
+          <a:prstGeom prst="straightConnector1">
+            <a:avLst/>
+          </a:prstGeom>
+          <a:ln>
+            <a:solidFill>
+              <a:schemeClr val="tx1"/>
+            </a:solidFill>
+            <a:tailEnd type="triangle"/>
+          </a:ln>
+        </p:spPr>
+        <p:style>
+          <a:lnRef idx="1">
+            <a:schemeClr val="accent1"/>
+          </a:lnRef>
+          <a:fillRef idx="0">
+            <a:schemeClr val="accent1"/>
+          </a:fillRef>
+          <a:effectRef idx="0">
+            <a:schemeClr val="accent1"/>
+          </a:effectRef>
+          <a:fontRef idx="minor">
+            <a:schemeClr val="tx1"/>
+          </a:fontRef>
+        </p:style>
+      </p:cxnSp>
+      <p:cxnSp>
+        <p:nvCxnSpPr>
+          <p:cNvPr id="53" name="Connecteur droit 52">
+            <a:extLst>
+              <a:ext uri="{FF2B5EF4-FFF2-40B4-BE49-F238E27FC236}">
+                <a16:creationId xmlns:a16="http://schemas.microsoft.com/office/drawing/2014/main" id="{36221A31-FD0B-F6F5-4EB3-7C32D8DAFB7B}"/>
+              </a:ext>
+            </a:extLst>
+          </p:cNvPr>
+          <p:cNvCxnSpPr>
+            <a:cxnSpLocks/>
+          </p:cNvCxnSpPr>
+          <p:nvPr/>
+        </p:nvCxnSpPr>
+        <p:spPr>
+          <a:xfrm>
+            <a:off x="10903772" y="1181355"/>
+            <a:ext cx="0" cy="2102934"/>
+          </a:xfrm>
+          <a:prstGeom prst="line">
+            <a:avLst/>
+          </a:prstGeom>
+          <a:ln>
+            <a:solidFill>
+              <a:schemeClr val="tx1"/>
+            </a:solidFill>
+          </a:ln>
+        </p:spPr>
+        <p:style>
+          <a:lnRef idx="1">
+            <a:schemeClr val="accent1"/>
+          </a:lnRef>
+          <a:fillRef idx="0">
+            <a:schemeClr val="accent1"/>
+          </a:fillRef>
+          <a:effectRef idx="0">
+            <a:schemeClr val="accent1"/>
+          </a:effectRef>
+          <a:fontRef idx="minor">
+            <a:schemeClr val="tx1"/>
+          </a:fontRef>
+        </p:style>
+      </p:cxnSp>
+      <p:cxnSp>
+        <p:nvCxnSpPr>
+          <p:cNvPr id="55" name="Connecteur droit avec flèche 54">
+            <a:extLst>
+              <a:ext uri="{FF2B5EF4-FFF2-40B4-BE49-F238E27FC236}">
+                <a16:creationId xmlns:a16="http://schemas.microsoft.com/office/drawing/2014/main" id="{D8CBC31D-EF18-A6EF-6B9A-BA9D61F55129}"/>
+              </a:ext>
+            </a:extLst>
+          </p:cNvPr>
+          <p:cNvCxnSpPr>
+            <a:cxnSpLocks/>
+            <a:endCxn id="37" idx="3"/>
+          </p:cNvCxnSpPr>
+          <p:nvPr/>
+        </p:nvCxnSpPr>
+        <p:spPr>
+          <a:xfrm flipH="1">
+            <a:off x="6666910" y="1181355"/>
+            <a:ext cx="4236492" cy="0"/>
+          </a:xfrm>
+          <a:prstGeom prst="straightConnector1">
+            <a:avLst/>
+          </a:prstGeom>
+          <a:ln>
+            <a:solidFill>
+              <a:schemeClr val="tx1"/>
+            </a:solidFill>
+            <a:tailEnd type="triangle"/>
+          </a:ln>
+        </p:spPr>
+        <p:style>
+          <a:lnRef idx="1">
+            <a:schemeClr val="accent1"/>
+          </a:lnRef>
+          <a:fillRef idx="0">
+            <a:schemeClr val="accent1"/>
+          </a:fillRef>
+          <a:effectRef idx="0">
+            <a:schemeClr val="accent1"/>
+          </a:effectRef>
+          <a:fontRef idx="minor">
+            <a:schemeClr val="tx1"/>
+          </a:fontRef>
+        </p:style>
+      </p:cxnSp>
+      <p:sp>
+        <p:nvSpPr>
+          <p:cNvPr id="59" name="ZoneTexte 58">
+            <a:extLst>
+              <a:ext uri="{FF2B5EF4-FFF2-40B4-BE49-F238E27FC236}">
+                <a16:creationId xmlns:a16="http://schemas.microsoft.com/office/drawing/2014/main" id="{7D5C58D1-26F1-10F8-7C3F-7A0D80CE3DE8}"/>
+              </a:ext>
+            </a:extLst>
+          </p:cNvPr>
+          <p:cNvSpPr txBox="1"/>
+          <p:nvPr/>
+        </p:nvSpPr>
+        <p:spPr>
+          <a:xfrm>
+            <a:off x="8214427" y="864837"/>
+            <a:ext cx="1011439" cy="307777"/>
+          </a:xfrm>
+          <a:prstGeom prst="rect">
+            <a:avLst/>
+          </a:prstGeom>
+          <a:noFill/>
+        </p:spPr>
+        <p:txBody>
+          <a:bodyPr wrap="square" rtlCol="0">
+            <a:spAutoFit/>
+          </a:bodyPr>
+          <a:lstStyle/>
+          <a:p>
+            <a:r>
+              <a:rPr lang="fr-FR" sz="1400" dirty="0"/>
+              <a:t>Valide</a:t>
             </a:r>
           </a:p>
         </p:txBody>

</xml_diff>